<commit_message>
Add a teacher's name and edit link video.
</commit_message>
<xml_diff>
--- a/PPT/Chapter 8.pptx
+++ b/PPT/Chapter 8.pptx
@@ -294,7 +294,7 @@
           <a:p>
             <a:fld id="{D74A0DAD-2960-4494-9AE9-D8EB06AD9F97}" type="datetimeFigureOut">
               <a:rPr lang="en-US" smtClean="0"/>
-              <a:t>5/14/2024</a:t>
+              <a:t>6/18/2024</a:t>
             </a:fld>
             <a:endParaRPr lang="en-US"/>
           </a:p>
@@ -492,7 +492,7 @@
           <a:p>
             <a:fld id="{D74A0DAD-2960-4494-9AE9-D8EB06AD9F97}" type="datetimeFigureOut">
               <a:rPr lang="en-US" smtClean="0"/>
-              <a:t>5/14/2024</a:t>
+              <a:t>6/18/2024</a:t>
             </a:fld>
             <a:endParaRPr lang="en-US"/>
           </a:p>
@@ -700,7 +700,7 @@
           <a:p>
             <a:fld id="{D74A0DAD-2960-4494-9AE9-D8EB06AD9F97}" type="datetimeFigureOut">
               <a:rPr lang="en-US" smtClean="0"/>
-              <a:t>5/14/2024</a:t>
+              <a:t>6/18/2024</a:t>
             </a:fld>
             <a:endParaRPr lang="en-US"/>
           </a:p>
@@ -898,7 +898,7 @@
           <a:p>
             <a:fld id="{D74A0DAD-2960-4494-9AE9-D8EB06AD9F97}" type="datetimeFigureOut">
               <a:rPr lang="en-US" smtClean="0"/>
-              <a:t>5/14/2024</a:t>
+              <a:t>6/18/2024</a:t>
             </a:fld>
             <a:endParaRPr lang="en-US"/>
           </a:p>
@@ -1173,7 +1173,7 @@
           <a:p>
             <a:fld id="{D74A0DAD-2960-4494-9AE9-D8EB06AD9F97}" type="datetimeFigureOut">
               <a:rPr lang="en-US" smtClean="0"/>
-              <a:t>5/14/2024</a:t>
+              <a:t>6/18/2024</a:t>
             </a:fld>
             <a:endParaRPr lang="en-US"/>
           </a:p>
@@ -1438,7 +1438,7 @@
           <a:p>
             <a:fld id="{D74A0DAD-2960-4494-9AE9-D8EB06AD9F97}" type="datetimeFigureOut">
               <a:rPr lang="en-US" smtClean="0"/>
-              <a:t>5/14/2024</a:t>
+              <a:t>6/18/2024</a:t>
             </a:fld>
             <a:endParaRPr lang="en-US"/>
           </a:p>
@@ -1850,7 +1850,7 @@
           <a:p>
             <a:fld id="{D74A0DAD-2960-4494-9AE9-D8EB06AD9F97}" type="datetimeFigureOut">
               <a:rPr lang="en-US" smtClean="0"/>
-              <a:t>5/14/2024</a:t>
+              <a:t>6/18/2024</a:t>
             </a:fld>
             <a:endParaRPr lang="en-US"/>
           </a:p>
@@ -1991,7 +1991,7 @@
           <a:p>
             <a:fld id="{D74A0DAD-2960-4494-9AE9-D8EB06AD9F97}" type="datetimeFigureOut">
               <a:rPr lang="en-US" smtClean="0"/>
-              <a:t>5/14/2024</a:t>
+              <a:t>6/18/2024</a:t>
             </a:fld>
             <a:endParaRPr lang="en-US"/>
           </a:p>
@@ -2104,7 +2104,7 @@
           <a:p>
             <a:fld id="{D74A0DAD-2960-4494-9AE9-D8EB06AD9F97}" type="datetimeFigureOut">
               <a:rPr lang="en-US" smtClean="0"/>
-              <a:t>5/14/2024</a:t>
+              <a:t>6/18/2024</a:t>
             </a:fld>
             <a:endParaRPr lang="en-US"/>
           </a:p>
@@ -2415,7 +2415,7 @@
           <a:p>
             <a:fld id="{D74A0DAD-2960-4494-9AE9-D8EB06AD9F97}" type="datetimeFigureOut">
               <a:rPr lang="en-US" smtClean="0"/>
-              <a:t>5/14/2024</a:t>
+              <a:t>6/18/2024</a:t>
             </a:fld>
             <a:endParaRPr lang="en-US"/>
           </a:p>
@@ -2703,7 +2703,7 @@
           <a:p>
             <a:fld id="{D74A0DAD-2960-4494-9AE9-D8EB06AD9F97}" type="datetimeFigureOut">
               <a:rPr lang="en-US" smtClean="0"/>
-              <a:t>5/14/2024</a:t>
+              <a:t>6/18/2024</a:t>
             </a:fld>
             <a:endParaRPr lang="en-US"/>
           </a:p>
@@ -2944,7 +2944,7 @@
           <a:p>
             <a:fld id="{D74A0DAD-2960-4494-9AE9-D8EB06AD9F97}" type="datetimeFigureOut">
               <a:rPr lang="en-US" smtClean="0"/>
-              <a:t>5/14/2024</a:t>
+              <a:t>6/18/2024</a:t>
             </a:fld>
             <a:endParaRPr lang="en-US"/>
           </a:p>
@@ -3567,6 +3567,88 @@
           </a:prstGeom>
         </p:spPr>
       </p:pic>
+      <p:sp>
+        <p:nvSpPr>
+          <p:cNvPr id="7" name="TextBox 6">
+            <a:extLst>
+              <a:ext uri="{FF2B5EF4-FFF2-40B4-BE49-F238E27FC236}">
+                <a16:creationId xmlns:a16="http://schemas.microsoft.com/office/drawing/2014/main" id="{53CB00D8-C14B-4B13-5719-6F1DBE66190A}"/>
+              </a:ext>
+            </a:extLst>
+          </p:cNvPr>
+          <p:cNvSpPr txBox="1"/>
+          <p:nvPr/>
+        </p:nvSpPr>
+        <p:spPr>
+          <a:xfrm>
+            <a:off x="114677" y="6172611"/>
+            <a:ext cx="5532120" cy="461665"/>
+          </a:xfrm>
+          <a:prstGeom prst="rect">
+            <a:avLst/>
+          </a:prstGeom>
+          <a:noFill/>
+        </p:spPr>
+        <p:txBody>
+          <a:bodyPr wrap="square">
+            <a:spAutoFit/>
+          </a:bodyPr>
+          <a:lstStyle/>
+          <a:p>
+            <a:pPr algn="l"/>
+            <a:r>
+              <a:rPr lang="th-TH" sz="2400" dirty="0">
+                <a:solidFill>
+                  <a:schemeClr val="bg1"/>
+                </a:solidFill>
+                <a:latin typeface="TH SarabunPSK" panose="020B0500040200020003" pitchFamily="34" charset="-34"/>
+                <a:cs typeface="TH SarabunPSK" panose="020B0500040200020003" pitchFamily="34" charset="-34"/>
+              </a:rPr>
+              <a:t>โดย ผศ</a:t>
+            </a:r>
+            <a:r>
+              <a:rPr lang="en-US" sz="2400" dirty="0">
+                <a:solidFill>
+                  <a:schemeClr val="bg1"/>
+                </a:solidFill>
+                <a:latin typeface="TH SarabunPSK" panose="020B0500040200020003" pitchFamily="34" charset="-34"/>
+                <a:cs typeface="TH SarabunPSK" panose="020B0500040200020003" pitchFamily="34" charset="-34"/>
+              </a:rPr>
+              <a:t>. </a:t>
+            </a:r>
+            <a:r>
+              <a:rPr lang="th-TH" sz="2400" dirty="0">
+                <a:solidFill>
+                  <a:schemeClr val="bg1"/>
+                </a:solidFill>
+                <a:latin typeface="TH SarabunPSK" panose="020B0500040200020003" pitchFamily="34" charset="-34"/>
+                <a:cs typeface="TH SarabunPSK" panose="020B0500040200020003" pitchFamily="34" charset="-34"/>
+              </a:rPr>
+              <a:t>ดร</a:t>
+            </a:r>
+            <a:r>
+              <a:rPr lang="en-US" sz="2400" dirty="0">
+                <a:solidFill>
+                  <a:schemeClr val="bg1"/>
+                </a:solidFill>
+                <a:latin typeface="TH SarabunPSK" panose="020B0500040200020003" pitchFamily="34" charset="-34"/>
+                <a:cs typeface="TH SarabunPSK" panose="020B0500040200020003" pitchFamily="34" charset="-34"/>
+              </a:rPr>
+              <a:t>.</a:t>
+            </a:r>
+            <a:r>
+              <a:rPr lang="th-TH" sz="2400" dirty="0">
+                <a:solidFill>
+                  <a:schemeClr val="bg1"/>
+                </a:solidFill>
+                <a:latin typeface="TH SarabunPSK" panose="020B0500040200020003" pitchFamily="34" charset="-34"/>
+                <a:cs typeface="TH SarabunPSK" panose="020B0500040200020003" pitchFamily="34" charset="-34"/>
+              </a:rPr>
+              <a:t>ธนพงศ์ อินทระ สาขาวิชาสถิติ มหาวิทยาลัยขอนแก่น </a:t>
+            </a:r>
+          </a:p>
+        </p:txBody>
+      </p:sp>
     </p:spTree>
     <p:extLst>
       <p:ext uri="{BB962C8B-B14F-4D97-AF65-F5344CB8AC3E}">
@@ -4654,6 +4736,88 @@
           </a:p>
         </p:txBody>
       </p:sp>
+      <p:sp>
+        <p:nvSpPr>
+          <p:cNvPr id="4" name="TextBox 3">
+            <a:extLst>
+              <a:ext uri="{FF2B5EF4-FFF2-40B4-BE49-F238E27FC236}">
+                <a16:creationId xmlns:a16="http://schemas.microsoft.com/office/drawing/2014/main" id="{7597660E-08EF-C292-BDAD-140A1A1FF1B1}"/>
+              </a:ext>
+            </a:extLst>
+          </p:cNvPr>
+          <p:cNvSpPr txBox="1"/>
+          <p:nvPr/>
+        </p:nvSpPr>
+        <p:spPr>
+          <a:xfrm>
+            <a:off x="124837" y="6451715"/>
+            <a:ext cx="5532120" cy="461665"/>
+          </a:xfrm>
+          <a:prstGeom prst="rect">
+            <a:avLst/>
+          </a:prstGeom>
+          <a:noFill/>
+        </p:spPr>
+        <p:txBody>
+          <a:bodyPr wrap="square">
+            <a:spAutoFit/>
+          </a:bodyPr>
+          <a:lstStyle/>
+          <a:p>
+            <a:pPr algn="l"/>
+            <a:r>
+              <a:rPr lang="th-TH" sz="2400" dirty="0">
+                <a:solidFill>
+                  <a:schemeClr val="bg1"/>
+                </a:solidFill>
+                <a:latin typeface="TH SarabunPSK" panose="020B0500040200020003" pitchFamily="34" charset="-34"/>
+                <a:cs typeface="TH SarabunPSK" panose="020B0500040200020003" pitchFamily="34" charset="-34"/>
+              </a:rPr>
+              <a:t>โดย ผศ</a:t>
+            </a:r>
+            <a:r>
+              <a:rPr lang="en-US" sz="2400" dirty="0">
+                <a:solidFill>
+                  <a:schemeClr val="bg1"/>
+                </a:solidFill>
+                <a:latin typeface="TH SarabunPSK" panose="020B0500040200020003" pitchFamily="34" charset="-34"/>
+                <a:cs typeface="TH SarabunPSK" panose="020B0500040200020003" pitchFamily="34" charset="-34"/>
+              </a:rPr>
+              <a:t>. </a:t>
+            </a:r>
+            <a:r>
+              <a:rPr lang="th-TH" sz="2400" dirty="0">
+                <a:solidFill>
+                  <a:schemeClr val="bg1"/>
+                </a:solidFill>
+                <a:latin typeface="TH SarabunPSK" panose="020B0500040200020003" pitchFamily="34" charset="-34"/>
+                <a:cs typeface="TH SarabunPSK" panose="020B0500040200020003" pitchFamily="34" charset="-34"/>
+              </a:rPr>
+              <a:t>ดร</a:t>
+            </a:r>
+            <a:r>
+              <a:rPr lang="en-US" sz="2400" dirty="0">
+                <a:solidFill>
+                  <a:schemeClr val="bg1"/>
+                </a:solidFill>
+                <a:latin typeface="TH SarabunPSK" panose="020B0500040200020003" pitchFamily="34" charset="-34"/>
+                <a:cs typeface="TH SarabunPSK" panose="020B0500040200020003" pitchFamily="34" charset="-34"/>
+              </a:rPr>
+              <a:t>.</a:t>
+            </a:r>
+            <a:r>
+              <a:rPr lang="th-TH" sz="2400" dirty="0">
+                <a:solidFill>
+                  <a:schemeClr val="bg1"/>
+                </a:solidFill>
+                <a:latin typeface="TH SarabunPSK" panose="020B0500040200020003" pitchFamily="34" charset="-34"/>
+                <a:cs typeface="TH SarabunPSK" panose="020B0500040200020003" pitchFamily="34" charset="-34"/>
+              </a:rPr>
+              <a:t>ธนพงศ์ อินทระ สาขาวิชาสถิติ มหาวิทยาลัยขอนแก่น </a:t>
+            </a:r>
+          </a:p>
+        </p:txBody>
+      </p:sp>
     </p:spTree>
     <p:extLst>
       <p:ext uri="{BB962C8B-B14F-4D97-AF65-F5344CB8AC3E}">
@@ -5750,6 +5914,88 @@
           </a:p>
         </p:txBody>
       </p:sp>
+      <p:sp>
+        <p:nvSpPr>
+          <p:cNvPr id="4" name="TextBox 3">
+            <a:extLst>
+              <a:ext uri="{FF2B5EF4-FFF2-40B4-BE49-F238E27FC236}">
+                <a16:creationId xmlns:a16="http://schemas.microsoft.com/office/drawing/2014/main" id="{6F4A1F43-F5E7-1751-CD73-A517E3940F3A}"/>
+              </a:ext>
+            </a:extLst>
+          </p:cNvPr>
+          <p:cNvSpPr txBox="1"/>
+          <p:nvPr/>
+        </p:nvSpPr>
+        <p:spPr>
+          <a:xfrm>
+            <a:off x="124837" y="6451715"/>
+            <a:ext cx="5532120" cy="461665"/>
+          </a:xfrm>
+          <a:prstGeom prst="rect">
+            <a:avLst/>
+          </a:prstGeom>
+          <a:noFill/>
+        </p:spPr>
+        <p:txBody>
+          <a:bodyPr wrap="square">
+            <a:spAutoFit/>
+          </a:bodyPr>
+          <a:lstStyle/>
+          <a:p>
+            <a:pPr algn="l"/>
+            <a:r>
+              <a:rPr lang="th-TH" sz="2400" dirty="0">
+                <a:solidFill>
+                  <a:schemeClr val="bg1"/>
+                </a:solidFill>
+                <a:latin typeface="TH SarabunPSK" panose="020B0500040200020003" pitchFamily="34" charset="-34"/>
+                <a:cs typeface="TH SarabunPSK" panose="020B0500040200020003" pitchFamily="34" charset="-34"/>
+              </a:rPr>
+              <a:t>โดย ผศ</a:t>
+            </a:r>
+            <a:r>
+              <a:rPr lang="en-US" sz="2400" dirty="0">
+                <a:solidFill>
+                  <a:schemeClr val="bg1"/>
+                </a:solidFill>
+                <a:latin typeface="TH SarabunPSK" panose="020B0500040200020003" pitchFamily="34" charset="-34"/>
+                <a:cs typeface="TH SarabunPSK" panose="020B0500040200020003" pitchFamily="34" charset="-34"/>
+              </a:rPr>
+              <a:t>. </a:t>
+            </a:r>
+            <a:r>
+              <a:rPr lang="th-TH" sz="2400" dirty="0">
+                <a:solidFill>
+                  <a:schemeClr val="bg1"/>
+                </a:solidFill>
+                <a:latin typeface="TH SarabunPSK" panose="020B0500040200020003" pitchFamily="34" charset="-34"/>
+                <a:cs typeface="TH SarabunPSK" panose="020B0500040200020003" pitchFamily="34" charset="-34"/>
+              </a:rPr>
+              <a:t>ดร</a:t>
+            </a:r>
+            <a:r>
+              <a:rPr lang="en-US" sz="2400" dirty="0">
+                <a:solidFill>
+                  <a:schemeClr val="bg1"/>
+                </a:solidFill>
+                <a:latin typeface="TH SarabunPSK" panose="020B0500040200020003" pitchFamily="34" charset="-34"/>
+                <a:cs typeface="TH SarabunPSK" panose="020B0500040200020003" pitchFamily="34" charset="-34"/>
+              </a:rPr>
+              <a:t>.</a:t>
+            </a:r>
+            <a:r>
+              <a:rPr lang="th-TH" sz="2400" dirty="0">
+                <a:solidFill>
+                  <a:schemeClr val="bg1"/>
+                </a:solidFill>
+                <a:latin typeface="TH SarabunPSK" panose="020B0500040200020003" pitchFamily="34" charset="-34"/>
+                <a:cs typeface="TH SarabunPSK" panose="020B0500040200020003" pitchFamily="34" charset="-34"/>
+              </a:rPr>
+              <a:t>ธนพงศ์ อินทระ สาขาวิชาสถิติ มหาวิทยาลัยขอนแก่น </a:t>
+            </a:r>
+          </a:p>
+        </p:txBody>
+      </p:sp>
     </p:spTree>
     <p:extLst>
       <p:ext uri="{BB962C8B-B14F-4D97-AF65-F5344CB8AC3E}">
@@ -6227,6 +6473,88 @@
           </a:p>
         </p:txBody>
       </p:sp>
+      <p:sp>
+        <p:nvSpPr>
+          <p:cNvPr id="4" name="TextBox 3">
+            <a:extLst>
+              <a:ext uri="{FF2B5EF4-FFF2-40B4-BE49-F238E27FC236}">
+                <a16:creationId xmlns:a16="http://schemas.microsoft.com/office/drawing/2014/main" id="{966E9B4F-D185-FF37-E070-6BDBCD65127F}"/>
+              </a:ext>
+            </a:extLst>
+          </p:cNvPr>
+          <p:cNvSpPr txBox="1"/>
+          <p:nvPr/>
+        </p:nvSpPr>
+        <p:spPr>
+          <a:xfrm>
+            <a:off x="124837" y="6451715"/>
+            <a:ext cx="5532120" cy="461665"/>
+          </a:xfrm>
+          <a:prstGeom prst="rect">
+            <a:avLst/>
+          </a:prstGeom>
+          <a:noFill/>
+        </p:spPr>
+        <p:txBody>
+          <a:bodyPr wrap="square">
+            <a:spAutoFit/>
+          </a:bodyPr>
+          <a:lstStyle/>
+          <a:p>
+            <a:pPr algn="l"/>
+            <a:r>
+              <a:rPr lang="th-TH" sz="2400" dirty="0">
+                <a:solidFill>
+                  <a:schemeClr val="bg1"/>
+                </a:solidFill>
+                <a:latin typeface="TH SarabunPSK" panose="020B0500040200020003" pitchFamily="34" charset="-34"/>
+                <a:cs typeface="TH SarabunPSK" panose="020B0500040200020003" pitchFamily="34" charset="-34"/>
+              </a:rPr>
+              <a:t>โดย ผศ</a:t>
+            </a:r>
+            <a:r>
+              <a:rPr lang="en-US" sz="2400" dirty="0">
+                <a:solidFill>
+                  <a:schemeClr val="bg1"/>
+                </a:solidFill>
+                <a:latin typeface="TH SarabunPSK" panose="020B0500040200020003" pitchFamily="34" charset="-34"/>
+                <a:cs typeface="TH SarabunPSK" panose="020B0500040200020003" pitchFamily="34" charset="-34"/>
+              </a:rPr>
+              <a:t>. </a:t>
+            </a:r>
+            <a:r>
+              <a:rPr lang="th-TH" sz="2400" dirty="0">
+                <a:solidFill>
+                  <a:schemeClr val="bg1"/>
+                </a:solidFill>
+                <a:latin typeface="TH SarabunPSK" panose="020B0500040200020003" pitchFamily="34" charset="-34"/>
+                <a:cs typeface="TH SarabunPSK" panose="020B0500040200020003" pitchFamily="34" charset="-34"/>
+              </a:rPr>
+              <a:t>ดร</a:t>
+            </a:r>
+            <a:r>
+              <a:rPr lang="en-US" sz="2400" dirty="0">
+                <a:solidFill>
+                  <a:schemeClr val="bg1"/>
+                </a:solidFill>
+                <a:latin typeface="TH SarabunPSK" panose="020B0500040200020003" pitchFamily="34" charset="-34"/>
+                <a:cs typeface="TH SarabunPSK" panose="020B0500040200020003" pitchFamily="34" charset="-34"/>
+              </a:rPr>
+              <a:t>.</a:t>
+            </a:r>
+            <a:r>
+              <a:rPr lang="th-TH" sz="2400" dirty="0">
+                <a:solidFill>
+                  <a:schemeClr val="bg1"/>
+                </a:solidFill>
+                <a:latin typeface="TH SarabunPSK" panose="020B0500040200020003" pitchFamily="34" charset="-34"/>
+                <a:cs typeface="TH SarabunPSK" panose="020B0500040200020003" pitchFamily="34" charset="-34"/>
+              </a:rPr>
+              <a:t>ธนพงศ์ อินทระ สาขาวิชาสถิติ มหาวิทยาลัยขอนแก่น </a:t>
+            </a:r>
+          </a:p>
+        </p:txBody>
+      </p:sp>
     </p:spTree>
     <p:extLst>
       <p:ext uri="{BB962C8B-B14F-4D97-AF65-F5344CB8AC3E}">
@@ -6776,6 +7104,88 @@
           </a:p>
         </p:txBody>
       </p:sp>
+      <p:sp>
+        <p:nvSpPr>
+          <p:cNvPr id="5" name="TextBox 4">
+            <a:extLst>
+              <a:ext uri="{FF2B5EF4-FFF2-40B4-BE49-F238E27FC236}">
+                <a16:creationId xmlns:a16="http://schemas.microsoft.com/office/drawing/2014/main" id="{8E289F5B-BCC4-DCA4-1922-C40F0AF45C1E}"/>
+              </a:ext>
+            </a:extLst>
+          </p:cNvPr>
+          <p:cNvSpPr txBox="1"/>
+          <p:nvPr/>
+        </p:nvSpPr>
+        <p:spPr>
+          <a:xfrm>
+            <a:off x="124837" y="6451715"/>
+            <a:ext cx="5532120" cy="461665"/>
+          </a:xfrm>
+          <a:prstGeom prst="rect">
+            <a:avLst/>
+          </a:prstGeom>
+          <a:noFill/>
+        </p:spPr>
+        <p:txBody>
+          <a:bodyPr wrap="square">
+            <a:spAutoFit/>
+          </a:bodyPr>
+          <a:lstStyle/>
+          <a:p>
+            <a:pPr algn="l"/>
+            <a:r>
+              <a:rPr lang="th-TH" sz="2400" dirty="0">
+                <a:solidFill>
+                  <a:schemeClr val="bg1"/>
+                </a:solidFill>
+                <a:latin typeface="TH SarabunPSK" panose="020B0500040200020003" pitchFamily="34" charset="-34"/>
+                <a:cs typeface="TH SarabunPSK" panose="020B0500040200020003" pitchFamily="34" charset="-34"/>
+              </a:rPr>
+              <a:t>โดย ผศ</a:t>
+            </a:r>
+            <a:r>
+              <a:rPr lang="en-US" sz="2400" dirty="0">
+                <a:solidFill>
+                  <a:schemeClr val="bg1"/>
+                </a:solidFill>
+                <a:latin typeface="TH SarabunPSK" panose="020B0500040200020003" pitchFamily="34" charset="-34"/>
+                <a:cs typeface="TH SarabunPSK" panose="020B0500040200020003" pitchFamily="34" charset="-34"/>
+              </a:rPr>
+              <a:t>. </a:t>
+            </a:r>
+            <a:r>
+              <a:rPr lang="th-TH" sz="2400" dirty="0">
+                <a:solidFill>
+                  <a:schemeClr val="bg1"/>
+                </a:solidFill>
+                <a:latin typeface="TH SarabunPSK" panose="020B0500040200020003" pitchFamily="34" charset="-34"/>
+                <a:cs typeface="TH SarabunPSK" panose="020B0500040200020003" pitchFamily="34" charset="-34"/>
+              </a:rPr>
+              <a:t>ดร</a:t>
+            </a:r>
+            <a:r>
+              <a:rPr lang="en-US" sz="2400" dirty="0">
+                <a:solidFill>
+                  <a:schemeClr val="bg1"/>
+                </a:solidFill>
+                <a:latin typeface="TH SarabunPSK" panose="020B0500040200020003" pitchFamily="34" charset="-34"/>
+                <a:cs typeface="TH SarabunPSK" panose="020B0500040200020003" pitchFamily="34" charset="-34"/>
+              </a:rPr>
+              <a:t>.</a:t>
+            </a:r>
+            <a:r>
+              <a:rPr lang="th-TH" sz="2400" dirty="0">
+                <a:solidFill>
+                  <a:schemeClr val="bg1"/>
+                </a:solidFill>
+                <a:latin typeface="TH SarabunPSK" panose="020B0500040200020003" pitchFamily="34" charset="-34"/>
+                <a:cs typeface="TH SarabunPSK" panose="020B0500040200020003" pitchFamily="34" charset="-34"/>
+              </a:rPr>
+              <a:t>ธนพงศ์ อินทระ สาขาวิชาสถิติ มหาวิทยาลัยขอนแก่น </a:t>
+            </a:r>
+          </a:p>
+        </p:txBody>
+      </p:sp>
     </p:spTree>
     <p:extLst>
       <p:ext uri="{BB962C8B-B14F-4D97-AF65-F5344CB8AC3E}">
@@ -7526,6 +7936,88 @@
           </a:p>
         </p:txBody>
       </p:sp>
+      <p:sp>
+        <p:nvSpPr>
+          <p:cNvPr id="5" name="TextBox 4">
+            <a:extLst>
+              <a:ext uri="{FF2B5EF4-FFF2-40B4-BE49-F238E27FC236}">
+                <a16:creationId xmlns:a16="http://schemas.microsoft.com/office/drawing/2014/main" id="{BA4BA1DA-B53C-B934-5F20-CB9557F5DA95}"/>
+              </a:ext>
+            </a:extLst>
+          </p:cNvPr>
+          <p:cNvSpPr txBox="1"/>
+          <p:nvPr/>
+        </p:nvSpPr>
+        <p:spPr>
+          <a:xfrm>
+            <a:off x="124837" y="6451715"/>
+            <a:ext cx="5532120" cy="461665"/>
+          </a:xfrm>
+          <a:prstGeom prst="rect">
+            <a:avLst/>
+          </a:prstGeom>
+          <a:noFill/>
+        </p:spPr>
+        <p:txBody>
+          <a:bodyPr wrap="square">
+            <a:spAutoFit/>
+          </a:bodyPr>
+          <a:lstStyle/>
+          <a:p>
+            <a:pPr algn="l"/>
+            <a:r>
+              <a:rPr lang="th-TH" sz="2400" dirty="0">
+                <a:solidFill>
+                  <a:schemeClr val="bg1"/>
+                </a:solidFill>
+                <a:latin typeface="TH SarabunPSK" panose="020B0500040200020003" pitchFamily="34" charset="-34"/>
+                <a:cs typeface="TH SarabunPSK" panose="020B0500040200020003" pitchFamily="34" charset="-34"/>
+              </a:rPr>
+              <a:t>โดย ผศ</a:t>
+            </a:r>
+            <a:r>
+              <a:rPr lang="en-US" sz="2400" dirty="0">
+                <a:solidFill>
+                  <a:schemeClr val="bg1"/>
+                </a:solidFill>
+                <a:latin typeface="TH SarabunPSK" panose="020B0500040200020003" pitchFamily="34" charset="-34"/>
+                <a:cs typeface="TH SarabunPSK" panose="020B0500040200020003" pitchFamily="34" charset="-34"/>
+              </a:rPr>
+              <a:t>. </a:t>
+            </a:r>
+            <a:r>
+              <a:rPr lang="th-TH" sz="2400" dirty="0">
+                <a:solidFill>
+                  <a:schemeClr val="bg1"/>
+                </a:solidFill>
+                <a:latin typeface="TH SarabunPSK" panose="020B0500040200020003" pitchFamily="34" charset="-34"/>
+                <a:cs typeface="TH SarabunPSK" panose="020B0500040200020003" pitchFamily="34" charset="-34"/>
+              </a:rPr>
+              <a:t>ดร</a:t>
+            </a:r>
+            <a:r>
+              <a:rPr lang="en-US" sz="2400" dirty="0">
+                <a:solidFill>
+                  <a:schemeClr val="bg1"/>
+                </a:solidFill>
+                <a:latin typeface="TH SarabunPSK" panose="020B0500040200020003" pitchFamily="34" charset="-34"/>
+                <a:cs typeface="TH SarabunPSK" panose="020B0500040200020003" pitchFamily="34" charset="-34"/>
+              </a:rPr>
+              <a:t>.</a:t>
+            </a:r>
+            <a:r>
+              <a:rPr lang="th-TH" sz="2400" dirty="0">
+                <a:solidFill>
+                  <a:schemeClr val="bg1"/>
+                </a:solidFill>
+                <a:latin typeface="TH SarabunPSK" panose="020B0500040200020003" pitchFamily="34" charset="-34"/>
+                <a:cs typeface="TH SarabunPSK" panose="020B0500040200020003" pitchFamily="34" charset="-34"/>
+              </a:rPr>
+              <a:t>ธนพงศ์ อินทระ สาขาวิชาสถิติ มหาวิทยาลัยขอนแก่น </a:t>
+            </a:r>
+          </a:p>
+        </p:txBody>
+      </p:sp>
     </p:spTree>
     <p:extLst>
       <p:ext uri="{BB962C8B-B14F-4D97-AF65-F5344CB8AC3E}">
@@ -8099,6 +8591,88 @@
           </a:p>
         </p:txBody>
       </p:sp>
+      <p:sp>
+        <p:nvSpPr>
+          <p:cNvPr id="5" name="TextBox 4">
+            <a:extLst>
+              <a:ext uri="{FF2B5EF4-FFF2-40B4-BE49-F238E27FC236}">
+                <a16:creationId xmlns:a16="http://schemas.microsoft.com/office/drawing/2014/main" id="{01174084-AEF4-E2DA-9AF3-EA843B5463B7}"/>
+              </a:ext>
+            </a:extLst>
+          </p:cNvPr>
+          <p:cNvSpPr txBox="1"/>
+          <p:nvPr/>
+        </p:nvSpPr>
+        <p:spPr>
+          <a:xfrm>
+            <a:off x="124837" y="6451715"/>
+            <a:ext cx="5532120" cy="461665"/>
+          </a:xfrm>
+          <a:prstGeom prst="rect">
+            <a:avLst/>
+          </a:prstGeom>
+          <a:noFill/>
+        </p:spPr>
+        <p:txBody>
+          <a:bodyPr wrap="square">
+            <a:spAutoFit/>
+          </a:bodyPr>
+          <a:lstStyle/>
+          <a:p>
+            <a:pPr algn="l"/>
+            <a:r>
+              <a:rPr lang="th-TH" sz="2400" dirty="0">
+                <a:solidFill>
+                  <a:schemeClr val="bg1"/>
+                </a:solidFill>
+                <a:latin typeface="TH SarabunPSK" panose="020B0500040200020003" pitchFamily="34" charset="-34"/>
+                <a:cs typeface="TH SarabunPSK" panose="020B0500040200020003" pitchFamily="34" charset="-34"/>
+              </a:rPr>
+              <a:t>โดย ผศ</a:t>
+            </a:r>
+            <a:r>
+              <a:rPr lang="en-US" sz="2400" dirty="0">
+                <a:solidFill>
+                  <a:schemeClr val="bg1"/>
+                </a:solidFill>
+                <a:latin typeface="TH SarabunPSK" panose="020B0500040200020003" pitchFamily="34" charset="-34"/>
+                <a:cs typeface="TH SarabunPSK" panose="020B0500040200020003" pitchFamily="34" charset="-34"/>
+              </a:rPr>
+              <a:t>. </a:t>
+            </a:r>
+            <a:r>
+              <a:rPr lang="th-TH" sz="2400" dirty="0">
+                <a:solidFill>
+                  <a:schemeClr val="bg1"/>
+                </a:solidFill>
+                <a:latin typeface="TH SarabunPSK" panose="020B0500040200020003" pitchFamily="34" charset="-34"/>
+                <a:cs typeface="TH SarabunPSK" panose="020B0500040200020003" pitchFamily="34" charset="-34"/>
+              </a:rPr>
+              <a:t>ดร</a:t>
+            </a:r>
+            <a:r>
+              <a:rPr lang="en-US" sz="2400" dirty="0">
+                <a:solidFill>
+                  <a:schemeClr val="bg1"/>
+                </a:solidFill>
+                <a:latin typeface="TH SarabunPSK" panose="020B0500040200020003" pitchFamily="34" charset="-34"/>
+                <a:cs typeface="TH SarabunPSK" panose="020B0500040200020003" pitchFamily="34" charset="-34"/>
+              </a:rPr>
+              <a:t>.</a:t>
+            </a:r>
+            <a:r>
+              <a:rPr lang="th-TH" sz="2400" dirty="0">
+                <a:solidFill>
+                  <a:schemeClr val="bg1"/>
+                </a:solidFill>
+                <a:latin typeface="TH SarabunPSK" panose="020B0500040200020003" pitchFamily="34" charset="-34"/>
+                <a:cs typeface="TH SarabunPSK" panose="020B0500040200020003" pitchFamily="34" charset="-34"/>
+              </a:rPr>
+              <a:t>ธนพงศ์ อินทระ สาขาวิชาสถิติ มหาวิทยาลัยขอนแก่น </a:t>
+            </a:r>
+          </a:p>
+        </p:txBody>
+      </p:sp>
     </p:spTree>
     <p:extLst>
       <p:ext uri="{BB962C8B-B14F-4D97-AF65-F5344CB8AC3E}">
@@ -8891,6 +9465,88 @@
           </a:p>
         </p:txBody>
       </p:sp>
+      <p:sp>
+        <p:nvSpPr>
+          <p:cNvPr id="4" name="TextBox 3">
+            <a:extLst>
+              <a:ext uri="{FF2B5EF4-FFF2-40B4-BE49-F238E27FC236}">
+                <a16:creationId xmlns:a16="http://schemas.microsoft.com/office/drawing/2014/main" id="{FC018D31-6076-B180-A381-0AA1B2D95018}"/>
+              </a:ext>
+            </a:extLst>
+          </p:cNvPr>
+          <p:cNvSpPr txBox="1"/>
+          <p:nvPr/>
+        </p:nvSpPr>
+        <p:spPr>
+          <a:xfrm>
+            <a:off x="124837" y="6451715"/>
+            <a:ext cx="5532120" cy="461665"/>
+          </a:xfrm>
+          <a:prstGeom prst="rect">
+            <a:avLst/>
+          </a:prstGeom>
+          <a:noFill/>
+        </p:spPr>
+        <p:txBody>
+          <a:bodyPr wrap="square">
+            <a:spAutoFit/>
+          </a:bodyPr>
+          <a:lstStyle/>
+          <a:p>
+            <a:pPr algn="l"/>
+            <a:r>
+              <a:rPr lang="th-TH" sz="2400" dirty="0">
+                <a:solidFill>
+                  <a:schemeClr val="bg1"/>
+                </a:solidFill>
+                <a:latin typeface="TH SarabunPSK" panose="020B0500040200020003" pitchFamily="34" charset="-34"/>
+                <a:cs typeface="TH SarabunPSK" panose="020B0500040200020003" pitchFamily="34" charset="-34"/>
+              </a:rPr>
+              <a:t>โดย ผศ</a:t>
+            </a:r>
+            <a:r>
+              <a:rPr lang="en-US" sz="2400" dirty="0">
+                <a:solidFill>
+                  <a:schemeClr val="bg1"/>
+                </a:solidFill>
+                <a:latin typeface="TH SarabunPSK" panose="020B0500040200020003" pitchFamily="34" charset="-34"/>
+                <a:cs typeface="TH SarabunPSK" panose="020B0500040200020003" pitchFamily="34" charset="-34"/>
+              </a:rPr>
+              <a:t>. </a:t>
+            </a:r>
+            <a:r>
+              <a:rPr lang="th-TH" sz="2400" dirty="0">
+                <a:solidFill>
+                  <a:schemeClr val="bg1"/>
+                </a:solidFill>
+                <a:latin typeface="TH SarabunPSK" panose="020B0500040200020003" pitchFamily="34" charset="-34"/>
+                <a:cs typeface="TH SarabunPSK" panose="020B0500040200020003" pitchFamily="34" charset="-34"/>
+              </a:rPr>
+              <a:t>ดร</a:t>
+            </a:r>
+            <a:r>
+              <a:rPr lang="en-US" sz="2400" dirty="0">
+                <a:solidFill>
+                  <a:schemeClr val="bg1"/>
+                </a:solidFill>
+                <a:latin typeface="TH SarabunPSK" panose="020B0500040200020003" pitchFamily="34" charset="-34"/>
+                <a:cs typeface="TH SarabunPSK" panose="020B0500040200020003" pitchFamily="34" charset="-34"/>
+              </a:rPr>
+              <a:t>.</a:t>
+            </a:r>
+            <a:r>
+              <a:rPr lang="th-TH" sz="2400" dirty="0">
+                <a:solidFill>
+                  <a:schemeClr val="bg1"/>
+                </a:solidFill>
+                <a:latin typeface="TH SarabunPSK" panose="020B0500040200020003" pitchFamily="34" charset="-34"/>
+                <a:cs typeface="TH SarabunPSK" panose="020B0500040200020003" pitchFamily="34" charset="-34"/>
+              </a:rPr>
+              <a:t>ธนพงศ์ อินทระ สาขาวิชาสถิติ มหาวิทยาลัยขอนแก่น </a:t>
+            </a:r>
+          </a:p>
+        </p:txBody>
+      </p:sp>
     </p:spTree>
     <p:extLst>
       <p:ext uri="{BB962C8B-B14F-4D97-AF65-F5344CB8AC3E}">
@@ -9650,6 +10306,88 @@
           </a:p>
         </p:txBody>
       </p:sp>
+      <p:sp>
+        <p:nvSpPr>
+          <p:cNvPr id="5" name="TextBox 4">
+            <a:extLst>
+              <a:ext uri="{FF2B5EF4-FFF2-40B4-BE49-F238E27FC236}">
+                <a16:creationId xmlns:a16="http://schemas.microsoft.com/office/drawing/2014/main" id="{2361BDE7-00A4-30F9-8504-722E0DF66EBE}"/>
+              </a:ext>
+            </a:extLst>
+          </p:cNvPr>
+          <p:cNvSpPr txBox="1"/>
+          <p:nvPr/>
+        </p:nvSpPr>
+        <p:spPr>
+          <a:xfrm>
+            <a:off x="124837" y="6451715"/>
+            <a:ext cx="5532120" cy="461665"/>
+          </a:xfrm>
+          <a:prstGeom prst="rect">
+            <a:avLst/>
+          </a:prstGeom>
+          <a:noFill/>
+        </p:spPr>
+        <p:txBody>
+          <a:bodyPr wrap="square">
+            <a:spAutoFit/>
+          </a:bodyPr>
+          <a:lstStyle/>
+          <a:p>
+            <a:pPr algn="l"/>
+            <a:r>
+              <a:rPr lang="th-TH" sz="2400" dirty="0">
+                <a:solidFill>
+                  <a:schemeClr val="bg1"/>
+                </a:solidFill>
+                <a:latin typeface="TH SarabunPSK" panose="020B0500040200020003" pitchFamily="34" charset="-34"/>
+                <a:cs typeface="TH SarabunPSK" panose="020B0500040200020003" pitchFamily="34" charset="-34"/>
+              </a:rPr>
+              <a:t>โดย ผศ</a:t>
+            </a:r>
+            <a:r>
+              <a:rPr lang="en-US" sz="2400" dirty="0">
+                <a:solidFill>
+                  <a:schemeClr val="bg1"/>
+                </a:solidFill>
+                <a:latin typeface="TH SarabunPSK" panose="020B0500040200020003" pitchFamily="34" charset="-34"/>
+                <a:cs typeface="TH SarabunPSK" panose="020B0500040200020003" pitchFamily="34" charset="-34"/>
+              </a:rPr>
+              <a:t>. </a:t>
+            </a:r>
+            <a:r>
+              <a:rPr lang="th-TH" sz="2400" dirty="0">
+                <a:solidFill>
+                  <a:schemeClr val="bg1"/>
+                </a:solidFill>
+                <a:latin typeface="TH SarabunPSK" panose="020B0500040200020003" pitchFamily="34" charset="-34"/>
+                <a:cs typeface="TH SarabunPSK" panose="020B0500040200020003" pitchFamily="34" charset="-34"/>
+              </a:rPr>
+              <a:t>ดร</a:t>
+            </a:r>
+            <a:r>
+              <a:rPr lang="en-US" sz="2400" dirty="0">
+                <a:solidFill>
+                  <a:schemeClr val="bg1"/>
+                </a:solidFill>
+                <a:latin typeface="TH SarabunPSK" panose="020B0500040200020003" pitchFamily="34" charset="-34"/>
+                <a:cs typeface="TH SarabunPSK" panose="020B0500040200020003" pitchFamily="34" charset="-34"/>
+              </a:rPr>
+              <a:t>.</a:t>
+            </a:r>
+            <a:r>
+              <a:rPr lang="th-TH" sz="2400" dirty="0">
+                <a:solidFill>
+                  <a:schemeClr val="bg1"/>
+                </a:solidFill>
+                <a:latin typeface="TH SarabunPSK" panose="020B0500040200020003" pitchFamily="34" charset="-34"/>
+                <a:cs typeface="TH SarabunPSK" panose="020B0500040200020003" pitchFamily="34" charset="-34"/>
+              </a:rPr>
+              <a:t>ธนพงศ์ อินทระ สาขาวิชาสถิติ มหาวิทยาลัยขอนแก่น </a:t>
+            </a:r>
+          </a:p>
+        </p:txBody>
+      </p:sp>
     </p:spTree>
     <p:extLst>
       <p:ext uri="{BB962C8B-B14F-4D97-AF65-F5344CB8AC3E}">
@@ -10735,6 +11473,88 @@
           </a:p>
         </p:txBody>
       </p:sp>
+      <p:sp>
+        <p:nvSpPr>
+          <p:cNvPr id="4" name="TextBox 3">
+            <a:extLst>
+              <a:ext uri="{FF2B5EF4-FFF2-40B4-BE49-F238E27FC236}">
+                <a16:creationId xmlns:a16="http://schemas.microsoft.com/office/drawing/2014/main" id="{4400D1B3-D8F3-1614-52B7-AA4466CC6D4B}"/>
+              </a:ext>
+            </a:extLst>
+          </p:cNvPr>
+          <p:cNvSpPr txBox="1"/>
+          <p:nvPr/>
+        </p:nvSpPr>
+        <p:spPr>
+          <a:xfrm>
+            <a:off x="124837" y="6451715"/>
+            <a:ext cx="5532120" cy="461665"/>
+          </a:xfrm>
+          <a:prstGeom prst="rect">
+            <a:avLst/>
+          </a:prstGeom>
+          <a:noFill/>
+        </p:spPr>
+        <p:txBody>
+          <a:bodyPr wrap="square">
+            <a:spAutoFit/>
+          </a:bodyPr>
+          <a:lstStyle/>
+          <a:p>
+            <a:pPr algn="l"/>
+            <a:r>
+              <a:rPr lang="th-TH" sz="2400" dirty="0">
+                <a:solidFill>
+                  <a:schemeClr val="bg1"/>
+                </a:solidFill>
+                <a:latin typeface="TH SarabunPSK" panose="020B0500040200020003" pitchFamily="34" charset="-34"/>
+                <a:cs typeface="TH SarabunPSK" panose="020B0500040200020003" pitchFamily="34" charset="-34"/>
+              </a:rPr>
+              <a:t>โดย ผศ</a:t>
+            </a:r>
+            <a:r>
+              <a:rPr lang="en-US" sz="2400" dirty="0">
+                <a:solidFill>
+                  <a:schemeClr val="bg1"/>
+                </a:solidFill>
+                <a:latin typeface="TH SarabunPSK" panose="020B0500040200020003" pitchFamily="34" charset="-34"/>
+                <a:cs typeface="TH SarabunPSK" panose="020B0500040200020003" pitchFamily="34" charset="-34"/>
+              </a:rPr>
+              <a:t>. </a:t>
+            </a:r>
+            <a:r>
+              <a:rPr lang="th-TH" sz="2400" dirty="0">
+                <a:solidFill>
+                  <a:schemeClr val="bg1"/>
+                </a:solidFill>
+                <a:latin typeface="TH SarabunPSK" panose="020B0500040200020003" pitchFamily="34" charset="-34"/>
+                <a:cs typeface="TH SarabunPSK" panose="020B0500040200020003" pitchFamily="34" charset="-34"/>
+              </a:rPr>
+              <a:t>ดร</a:t>
+            </a:r>
+            <a:r>
+              <a:rPr lang="en-US" sz="2400" dirty="0">
+                <a:solidFill>
+                  <a:schemeClr val="bg1"/>
+                </a:solidFill>
+                <a:latin typeface="TH SarabunPSK" panose="020B0500040200020003" pitchFamily="34" charset="-34"/>
+                <a:cs typeface="TH SarabunPSK" panose="020B0500040200020003" pitchFamily="34" charset="-34"/>
+              </a:rPr>
+              <a:t>.</a:t>
+            </a:r>
+            <a:r>
+              <a:rPr lang="th-TH" sz="2400" dirty="0">
+                <a:solidFill>
+                  <a:schemeClr val="bg1"/>
+                </a:solidFill>
+                <a:latin typeface="TH SarabunPSK" panose="020B0500040200020003" pitchFamily="34" charset="-34"/>
+                <a:cs typeface="TH SarabunPSK" panose="020B0500040200020003" pitchFamily="34" charset="-34"/>
+              </a:rPr>
+              <a:t>ธนพงศ์ อินทระ สาขาวิชาสถิติ มหาวิทยาลัยขอนแก่น </a:t>
+            </a:r>
+          </a:p>
+        </p:txBody>
+      </p:sp>
     </p:spTree>
     <p:extLst>
       <p:ext uri="{BB962C8B-B14F-4D97-AF65-F5344CB8AC3E}">
@@ -11877,6 +12697,88 @@
           </a:p>
         </p:txBody>
       </p:sp>
+      <p:sp>
+        <p:nvSpPr>
+          <p:cNvPr id="5" name="TextBox 4">
+            <a:extLst>
+              <a:ext uri="{FF2B5EF4-FFF2-40B4-BE49-F238E27FC236}">
+                <a16:creationId xmlns:a16="http://schemas.microsoft.com/office/drawing/2014/main" id="{42400BC6-39C2-EE4A-87DE-A499A8126ECA}"/>
+              </a:ext>
+            </a:extLst>
+          </p:cNvPr>
+          <p:cNvSpPr txBox="1"/>
+          <p:nvPr/>
+        </p:nvSpPr>
+        <p:spPr>
+          <a:xfrm>
+            <a:off x="124837" y="6451715"/>
+            <a:ext cx="5532120" cy="461665"/>
+          </a:xfrm>
+          <a:prstGeom prst="rect">
+            <a:avLst/>
+          </a:prstGeom>
+          <a:noFill/>
+        </p:spPr>
+        <p:txBody>
+          <a:bodyPr wrap="square">
+            <a:spAutoFit/>
+          </a:bodyPr>
+          <a:lstStyle/>
+          <a:p>
+            <a:pPr algn="l"/>
+            <a:r>
+              <a:rPr lang="th-TH" sz="2400" dirty="0">
+                <a:solidFill>
+                  <a:schemeClr val="bg1"/>
+                </a:solidFill>
+                <a:latin typeface="TH SarabunPSK" panose="020B0500040200020003" pitchFamily="34" charset="-34"/>
+                <a:cs typeface="TH SarabunPSK" panose="020B0500040200020003" pitchFamily="34" charset="-34"/>
+              </a:rPr>
+              <a:t>โดย ผศ</a:t>
+            </a:r>
+            <a:r>
+              <a:rPr lang="en-US" sz="2400" dirty="0">
+                <a:solidFill>
+                  <a:schemeClr val="bg1"/>
+                </a:solidFill>
+                <a:latin typeface="TH SarabunPSK" panose="020B0500040200020003" pitchFamily="34" charset="-34"/>
+                <a:cs typeface="TH SarabunPSK" panose="020B0500040200020003" pitchFamily="34" charset="-34"/>
+              </a:rPr>
+              <a:t>. </a:t>
+            </a:r>
+            <a:r>
+              <a:rPr lang="th-TH" sz="2400" dirty="0">
+                <a:solidFill>
+                  <a:schemeClr val="bg1"/>
+                </a:solidFill>
+                <a:latin typeface="TH SarabunPSK" panose="020B0500040200020003" pitchFamily="34" charset="-34"/>
+                <a:cs typeface="TH SarabunPSK" panose="020B0500040200020003" pitchFamily="34" charset="-34"/>
+              </a:rPr>
+              <a:t>ดร</a:t>
+            </a:r>
+            <a:r>
+              <a:rPr lang="en-US" sz="2400" dirty="0">
+                <a:solidFill>
+                  <a:schemeClr val="bg1"/>
+                </a:solidFill>
+                <a:latin typeface="TH SarabunPSK" panose="020B0500040200020003" pitchFamily="34" charset="-34"/>
+                <a:cs typeface="TH SarabunPSK" panose="020B0500040200020003" pitchFamily="34" charset="-34"/>
+              </a:rPr>
+              <a:t>.</a:t>
+            </a:r>
+            <a:r>
+              <a:rPr lang="th-TH" sz="2400" dirty="0">
+                <a:solidFill>
+                  <a:schemeClr val="bg1"/>
+                </a:solidFill>
+                <a:latin typeface="TH SarabunPSK" panose="020B0500040200020003" pitchFamily="34" charset="-34"/>
+                <a:cs typeface="TH SarabunPSK" panose="020B0500040200020003" pitchFamily="34" charset="-34"/>
+              </a:rPr>
+              <a:t>ธนพงศ์ อินทระ สาขาวิชาสถิติ มหาวิทยาลัยขอนแก่น </a:t>
+            </a:r>
+          </a:p>
+        </p:txBody>
+      </p:sp>
     </p:spTree>
     <p:extLst>
       <p:ext uri="{BB962C8B-B14F-4D97-AF65-F5344CB8AC3E}">
@@ -12389,6 +13291,88 @@
           </a:prstGeom>
         </p:spPr>
       </p:pic>
+      <p:sp>
+        <p:nvSpPr>
+          <p:cNvPr id="5" name="TextBox 4">
+            <a:extLst>
+              <a:ext uri="{FF2B5EF4-FFF2-40B4-BE49-F238E27FC236}">
+                <a16:creationId xmlns:a16="http://schemas.microsoft.com/office/drawing/2014/main" id="{5D31419F-CF13-BED6-96E5-782C2180D889}"/>
+              </a:ext>
+            </a:extLst>
+          </p:cNvPr>
+          <p:cNvSpPr txBox="1"/>
+          <p:nvPr/>
+        </p:nvSpPr>
+        <p:spPr>
+          <a:xfrm>
+            <a:off x="124837" y="6451715"/>
+            <a:ext cx="5532120" cy="461665"/>
+          </a:xfrm>
+          <a:prstGeom prst="rect">
+            <a:avLst/>
+          </a:prstGeom>
+          <a:noFill/>
+        </p:spPr>
+        <p:txBody>
+          <a:bodyPr wrap="square">
+            <a:spAutoFit/>
+          </a:bodyPr>
+          <a:lstStyle/>
+          <a:p>
+            <a:pPr algn="l"/>
+            <a:r>
+              <a:rPr lang="th-TH" sz="2400" dirty="0">
+                <a:solidFill>
+                  <a:schemeClr val="bg1"/>
+                </a:solidFill>
+                <a:latin typeface="TH SarabunPSK" panose="020B0500040200020003" pitchFamily="34" charset="-34"/>
+                <a:cs typeface="TH SarabunPSK" panose="020B0500040200020003" pitchFamily="34" charset="-34"/>
+              </a:rPr>
+              <a:t>โดย ผศ</a:t>
+            </a:r>
+            <a:r>
+              <a:rPr lang="en-US" sz="2400" dirty="0">
+                <a:solidFill>
+                  <a:schemeClr val="bg1"/>
+                </a:solidFill>
+                <a:latin typeface="TH SarabunPSK" panose="020B0500040200020003" pitchFamily="34" charset="-34"/>
+                <a:cs typeface="TH SarabunPSK" panose="020B0500040200020003" pitchFamily="34" charset="-34"/>
+              </a:rPr>
+              <a:t>. </a:t>
+            </a:r>
+            <a:r>
+              <a:rPr lang="th-TH" sz="2400" dirty="0">
+                <a:solidFill>
+                  <a:schemeClr val="bg1"/>
+                </a:solidFill>
+                <a:latin typeface="TH SarabunPSK" panose="020B0500040200020003" pitchFamily="34" charset="-34"/>
+                <a:cs typeface="TH SarabunPSK" panose="020B0500040200020003" pitchFamily="34" charset="-34"/>
+              </a:rPr>
+              <a:t>ดร</a:t>
+            </a:r>
+            <a:r>
+              <a:rPr lang="en-US" sz="2400" dirty="0">
+                <a:solidFill>
+                  <a:schemeClr val="bg1"/>
+                </a:solidFill>
+                <a:latin typeface="TH SarabunPSK" panose="020B0500040200020003" pitchFamily="34" charset="-34"/>
+                <a:cs typeface="TH SarabunPSK" panose="020B0500040200020003" pitchFamily="34" charset="-34"/>
+              </a:rPr>
+              <a:t>.</a:t>
+            </a:r>
+            <a:r>
+              <a:rPr lang="th-TH" sz="2400" dirty="0">
+                <a:solidFill>
+                  <a:schemeClr val="bg1"/>
+                </a:solidFill>
+                <a:latin typeface="TH SarabunPSK" panose="020B0500040200020003" pitchFamily="34" charset="-34"/>
+                <a:cs typeface="TH SarabunPSK" panose="020B0500040200020003" pitchFamily="34" charset="-34"/>
+              </a:rPr>
+              <a:t>ธนพงศ์ อินทระ สาขาวิชาสถิติ มหาวิทยาลัยขอนแก่น </a:t>
+            </a:r>
+          </a:p>
+        </p:txBody>
+      </p:sp>
     </p:spTree>
     <p:extLst>
       <p:ext uri="{BB962C8B-B14F-4D97-AF65-F5344CB8AC3E}">
@@ -13553,6 +14537,88 @@
           </a:p>
         </p:txBody>
       </p:sp>
+      <p:sp>
+        <p:nvSpPr>
+          <p:cNvPr id="4" name="TextBox 3">
+            <a:extLst>
+              <a:ext uri="{FF2B5EF4-FFF2-40B4-BE49-F238E27FC236}">
+                <a16:creationId xmlns:a16="http://schemas.microsoft.com/office/drawing/2014/main" id="{DA9DB076-8C8F-FB59-4FA1-C3C92078D7EC}"/>
+              </a:ext>
+            </a:extLst>
+          </p:cNvPr>
+          <p:cNvSpPr txBox="1"/>
+          <p:nvPr/>
+        </p:nvSpPr>
+        <p:spPr>
+          <a:xfrm>
+            <a:off x="124837" y="6451715"/>
+            <a:ext cx="5532120" cy="461665"/>
+          </a:xfrm>
+          <a:prstGeom prst="rect">
+            <a:avLst/>
+          </a:prstGeom>
+          <a:noFill/>
+        </p:spPr>
+        <p:txBody>
+          <a:bodyPr wrap="square">
+            <a:spAutoFit/>
+          </a:bodyPr>
+          <a:lstStyle/>
+          <a:p>
+            <a:pPr algn="l"/>
+            <a:r>
+              <a:rPr lang="th-TH" sz="2400" dirty="0">
+                <a:solidFill>
+                  <a:schemeClr val="bg1"/>
+                </a:solidFill>
+                <a:latin typeface="TH SarabunPSK" panose="020B0500040200020003" pitchFamily="34" charset="-34"/>
+                <a:cs typeface="TH SarabunPSK" panose="020B0500040200020003" pitchFamily="34" charset="-34"/>
+              </a:rPr>
+              <a:t>โดย ผศ</a:t>
+            </a:r>
+            <a:r>
+              <a:rPr lang="en-US" sz="2400" dirty="0">
+                <a:solidFill>
+                  <a:schemeClr val="bg1"/>
+                </a:solidFill>
+                <a:latin typeface="TH SarabunPSK" panose="020B0500040200020003" pitchFamily="34" charset="-34"/>
+                <a:cs typeface="TH SarabunPSK" panose="020B0500040200020003" pitchFamily="34" charset="-34"/>
+              </a:rPr>
+              <a:t>. </a:t>
+            </a:r>
+            <a:r>
+              <a:rPr lang="th-TH" sz="2400" dirty="0">
+                <a:solidFill>
+                  <a:schemeClr val="bg1"/>
+                </a:solidFill>
+                <a:latin typeface="TH SarabunPSK" panose="020B0500040200020003" pitchFamily="34" charset="-34"/>
+                <a:cs typeface="TH SarabunPSK" panose="020B0500040200020003" pitchFamily="34" charset="-34"/>
+              </a:rPr>
+              <a:t>ดร</a:t>
+            </a:r>
+            <a:r>
+              <a:rPr lang="en-US" sz="2400" dirty="0">
+                <a:solidFill>
+                  <a:schemeClr val="bg1"/>
+                </a:solidFill>
+                <a:latin typeface="TH SarabunPSK" panose="020B0500040200020003" pitchFamily="34" charset="-34"/>
+                <a:cs typeface="TH SarabunPSK" panose="020B0500040200020003" pitchFamily="34" charset="-34"/>
+              </a:rPr>
+              <a:t>.</a:t>
+            </a:r>
+            <a:r>
+              <a:rPr lang="th-TH" sz="2400" dirty="0">
+                <a:solidFill>
+                  <a:schemeClr val="bg1"/>
+                </a:solidFill>
+                <a:latin typeface="TH SarabunPSK" panose="020B0500040200020003" pitchFamily="34" charset="-34"/>
+                <a:cs typeface="TH SarabunPSK" panose="020B0500040200020003" pitchFamily="34" charset="-34"/>
+              </a:rPr>
+              <a:t>ธนพงศ์ อินทระ สาขาวิชาสถิติ มหาวิทยาลัยขอนแก่น </a:t>
+            </a:r>
+          </a:p>
+        </p:txBody>
+      </p:sp>
     </p:spTree>
     <p:extLst>
       <p:ext uri="{BB962C8B-B14F-4D97-AF65-F5344CB8AC3E}">
@@ -15044,6 +16110,88 @@
           </a:p>
         </p:txBody>
       </p:sp>
+      <p:sp>
+        <p:nvSpPr>
+          <p:cNvPr id="4" name="TextBox 3">
+            <a:extLst>
+              <a:ext uri="{FF2B5EF4-FFF2-40B4-BE49-F238E27FC236}">
+                <a16:creationId xmlns:a16="http://schemas.microsoft.com/office/drawing/2014/main" id="{AC990B69-DBF9-3ABD-2CD8-7842F71AE358}"/>
+              </a:ext>
+            </a:extLst>
+          </p:cNvPr>
+          <p:cNvSpPr txBox="1"/>
+          <p:nvPr/>
+        </p:nvSpPr>
+        <p:spPr>
+          <a:xfrm>
+            <a:off x="124837" y="6451715"/>
+            <a:ext cx="5532120" cy="461665"/>
+          </a:xfrm>
+          <a:prstGeom prst="rect">
+            <a:avLst/>
+          </a:prstGeom>
+          <a:noFill/>
+        </p:spPr>
+        <p:txBody>
+          <a:bodyPr wrap="square">
+            <a:spAutoFit/>
+          </a:bodyPr>
+          <a:lstStyle/>
+          <a:p>
+            <a:pPr algn="l"/>
+            <a:r>
+              <a:rPr lang="th-TH" sz="2400" dirty="0">
+                <a:solidFill>
+                  <a:schemeClr val="bg1"/>
+                </a:solidFill>
+                <a:latin typeface="TH SarabunPSK" panose="020B0500040200020003" pitchFamily="34" charset="-34"/>
+                <a:cs typeface="TH SarabunPSK" panose="020B0500040200020003" pitchFamily="34" charset="-34"/>
+              </a:rPr>
+              <a:t>โดย ผศ</a:t>
+            </a:r>
+            <a:r>
+              <a:rPr lang="en-US" sz="2400" dirty="0">
+                <a:solidFill>
+                  <a:schemeClr val="bg1"/>
+                </a:solidFill>
+                <a:latin typeface="TH SarabunPSK" panose="020B0500040200020003" pitchFamily="34" charset="-34"/>
+                <a:cs typeface="TH SarabunPSK" panose="020B0500040200020003" pitchFamily="34" charset="-34"/>
+              </a:rPr>
+              <a:t>. </a:t>
+            </a:r>
+            <a:r>
+              <a:rPr lang="th-TH" sz="2400" dirty="0">
+                <a:solidFill>
+                  <a:schemeClr val="bg1"/>
+                </a:solidFill>
+                <a:latin typeface="TH SarabunPSK" panose="020B0500040200020003" pitchFamily="34" charset="-34"/>
+                <a:cs typeface="TH SarabunPSK" panose="020B0500040200020003" pitchFamily="34" charset="-34"/>
+              </a:rPr>
+              <a:t>ดร</a:t>
+            </a:r>
+            <a:r>
+              <a:rPr lang="en-US" sz="2400" dirty="0">
+                <a:solidFill>
+                  <a:schemeClr val="bg1"/>
+                </a:solidFill>
+                <a:latin typeface="TH SarabunPSK" panose="020B0500040200020003" pitchFamily="34" charset="-34"/>
+                <a:cs typeface="TH SarabunPSK" panose="020B0500040200020003" pitchFamily="34" charset="-34"/>
+              </a:rPr>
+              <a:t>.</a:t>
+            </a:r>
+            <a:r>
+              <a:rPr lang="th-TH" sz="2400" dirty="0">
+                <a:solidFill>
+                  <a:schemeClr val="bg1"/>
+                </a:solidFill>
+                <a:latin typeface="TH SarabunPSK" panose="020B0500040200020003" pitchFamily="34" charset="-34"/>
+                <a:cs typeface="TH SarabunPSK" panose="020B0500040200020003" pitchFamily="34" charset="-34"/>
+              </a:rPr>
+              <a:t>ธนพงศ์ อินทระ สาขาวิชาสถิติ มหาวิทยาลัยขอนแก่น </a:t>
+            </a:r>
+          </a:p>
+        </p:txBody>
+      </p:sp>
     </p:spTree>
     <p:extLst>
       <p:ext uri="{BB962C8B-B14F-4D97-AF65-F5344CB8AC3E}">
@@ -15895,6 +17043,88 @@
           </a:p>
         </p:txBody>
       </p:sp>
+      <p:sp>
+        <p:nvSpPr>
+          <p:cNvPr id="5" name="TextBox 4">
+            <a:extLst>
+              <a:ext uri="{FF2B5EF4-FFF2-40B4-BE49-F238E27FC236}">
+                <a16:creationId xmlns:a16="http://schemas.microsoft.com/office/drawing/2014/main" id="{8E911071-B2EC-224F-F871-049A566A7031}"/>
+              </a:ext>
+            </a:extLst>
+          </p:cNvPr>
+          <p:cNvSpPr txBox="1"/>
+          <p:nvPr/>
+        </p:nvSpPr>
+        <p:spPr>
+          <a:xfrm>
+            <a:off x="124837" y="6451715"/>
+            <a:ext cx="5532120" cy="461665"/>
+          </a:xfrm>
+          <a:prstGeom prst="rect">
+            <a:avLst/>
+          </a:prstGeom>
+          <a:noFill/>
+        </p:spPr>
+        <p:txBody>
+          <a:bodyPr wrap="square">
+            <a:spAutoFit/>
+          </a:bodyPr>
+          <a:lstStyle/>
+          <a:p>
+            <a:pPr algn="l"/>
+            <a:r>
+              <a:rPr lang="th-TH" sz="2400" dirty="0">
+                <a:solidFill>
+                  <a:schemeClr val="bg1"/>
+                </a:solidFill>
+                <a:latin typeface="TH SarabunPSK" panose="020B0500040200020003" pitchFamily="34" charset="-34"/>
+                <a:cs typeface="TH SarabunPSK" panose="020B0500040200020003" pitchFamily="34" charset="-34"/>
+              </a:rPr>
+              <a:t>โดย ผศ</a:t>
+            </a:r>
+            <a:r>
+              <a:rPr lang="en-US" sz="2400" dirty="0">
+                <a:solidFill>
+                  <a:schemeClr val="bg1"/>
+                </a:solidFill>
+                <a:latin typeface="TH SarabunPSK" panose="020B0500040200020003" pitchFamily="34" charset="-34"/>
+                <a:cs typeface="TH SarabunPSK" panose="020B0500040200020003" pitchFamily="34" charset="-34"/>
+              </a:rPr>
+              <a:t>. </a:t>
+            </a:r>
+            <a:r>
+              <a:rPr lang="th-TH" sz="2400" dirty="0">
+                <a:solidFill>
+                  <a:schemeClr val="bg1"/>
+                </a:solidFill>
+                <a:latin typeface="TH SarabunPSK" panose="020B0500040200020003" pitchFamily="34" charset="-34"/>
+                <a:cs typeface="TH SarabunPSK" panose="020B0500040200020003" pitchFamily="34" charset="-34"/>
+              </a:rPr>
+              <a:t>ดร</a:t>
+            </a:r>
+            <a:r>
+              <a:rPr lang="en-US" sz="2400" dirty="0">
+                <a:solidFill>
+                  <a:schemeClr val="bg1"/>
+                </a:solidFill>
+                <a:latin typeface="TH SarabunPSK" panose="020B0500040200020003" pitchFamily="34" charset="-34"/>
+                <a:cs typeface="TH SarabunPSK" panose="020B0500040200020003" pitchFamily="34" charset="-34"/>
+              </a:rPr>
+              <a:t>.</a:t>
+            </a:r>
+            <a:r>
+              <a:rPr lang="th-TH" sz="2400" dirty="0">
+                <a:solidFill>
+                  <a:schemeClr val="bg1"/>
+                </a:solidFill>
+                <a:latin typeface="TH SarabunPSK" panose="020B0500040200020003" pitchFamily="34" charset="-34"/>
+                <a:cs typeface="TH SarabunPSK" panose="020B0500040200020003" pitchFamily="34" charset="-34"/>
+              </a:rPr>
+              <a:t>ธนพงศ์ อินทระ สาขาวิชาสถิติ มหาวิทยาลัยขอนแก่น </a:t>
+            </a:r>
+          </a:p>
+        </p:txBody>
+      </p:sp>
     </p:spTree>
     <p:extLst>
       <p:ext uri="{BB962C8B-B14F-4D97-AF65-F5344CB8AC3E}">
@@ -16432,6 +17662,88 @@
           </a:p>
         </p:txBody>
       </p:sp>
+      <p:sp>
+        <p:nvSpPr>
+          <p:cNvPr id="5" name="TextBox 4">
+            <a:extLst>
+              <a:ext uri="{FF2B5EF4-FFF2-40B4-BE49-F238E27FC236}">
+                <a16:creationId xmlns:a16="http://schemas.microsoft.com/office/drawing/2014/main" id="{B3F10494-DD37-2B03-83AB-497B92A40632}"/>
+              </a:ext>
+            </a:extLst>
+          </p:cNvPr>
+          <p:cNvSpPr txBox="1"/>
+          <p:nvPr/>
+        </p:nvSpPr>
+        <p:spPr>
+          <a:xfrm>
+            <a:off x="124837" y="6451715"/>
+            <a:ext cx="5532120" cy="461665"/>
+          </a:xfrm>
+          <a:prstGeom prst="rect">
+            <a:avLst/>
+          </a:prstGeom>
+          <a:noFill/>
+        </p:spPr>
+        <p:txBody>
+          <a:bodyPr wrap="square">
+            <a:spAutoFit/>
+          </a:bodyPr>
+          <a:lstStyle/>
+          <a:p>
+            <a:pPr algn="l"/>
+            <a:r>
+              <a:rPr lang="th-TH" sz="2400" dirty="0">
+                <a:solidFill>
+                  <a:schemeClr val="bg1"/>
+                </a:solidFill>
+                <a:latin typeface="TH SarabunPSK" panose="020B0500040200020003" pitchFamily="34" charset="-34"/>
+                <a:cs typeface="TH SarabunPSK" panose="020B0500040200020003" pitchFamily="34" charset="-34"/>
+              </a:rPr>
+              <a:t>โดย ผศ</a:t>
+            </a:r>
+            <a:r>
+              <a:rPr lang="en-US" sz="2400" dirty="0">
+                <a:solidFill>
+                  <a:schemeClr val="bg1"/>
+                </a:solidFill>
+                <a:latin typeface="TH SarabunPSK" panose="020B0500040200020003" pitchFamily="34" charset="-34"/>
+                <a:cs typeface="TH SarabunPSK" panose="020B0500040200020003" pitchFamily="34" charset="-34"/>
+              </a:rPr>
+              <a:t>. </a:t>
+            </a:r>
+            <a:r>
+              <a:rPr lang="th-TH" sz="2400" dirty="0">
+                <a:solidFill>
+                  <a:schemeClr val="bg1"/>
+                </a:solidFill>
+                <a:latin typeface="TH SarabunPSK" panose="020B0500040200020003" pitchFamily="34" charset="-34"/>
+                <a:cs typeface="TH SarabunPSK" panose="020B0500040200020003" pitchFamily="34" charset="-34"/>
+              </a:rPr>
+              <a:t>ดร</a:t>
+            </a:r>
+            <a:r>
+              <a:rPr lang="en-US" sz="2400" dirty="0">
+                <a:solidFill>
+                  <a:schemeClr val="bg1"/>
+                </a:solidFill>
+                <a:latin typeface="TH SarabunPSK" panose="020B0500040200020003" pitchFamily="34" charset="-34"/>
+                <a:cs typeface="TH SarabunPSK" panose="020B0500040200020003" pitchFamily="34" charset="-34"/>
+              </a:rPr>
+              <a:t>.</a:t>
+            </a:r>
+            <a:r>
+              <a:rPr lang="th-TH" sz="2400" dirty="0">
+                <a:solidFill>
+                  <a:schemeClr val="bg1"/>
+                </a:solidFill>
+                <a:latin typeface="TH SarabunPSK" panose="020B0500040200020003" pitchFamily="34" charset="-34"/>
+                <a:cs typeface="TH SarabunPSK" panose="020B0500040200020003" pitchFamily="34" charset="-34"/>
+              </a:rPr>
+              <a:t>ธนพงศ์ อินทระ สาขาวิชาสถิติ มหาวิทยาลัยขอนแก่น </a:t>
+            </a:r>
+          </a:p>
+        </p:txBody>
+      </p:sp>
     </p:spTree>
     <p:extLst>
       <p:ext uri="{BB962C8B-B14F-4D97-AF65-F5344CB8AC3E}">
@@ -17086,6 +18398,88 @@
           </a:p>
         </p:txBody>
       </p:sp>
+      <p:sp>
+        <p:nvSpPr>
+          <p:cNvPr id="5" name="TextBox 4">
+            <a:extLst>
+              <a:ext uri="{FF2B5EF4-FFF2-40B4-BE49-F238E27FC236}">
+                <a16:creationId xmlns:a16="http://schemas.microsoft.com/office/drawing/2014/main" id="{D08DD2B4-6442-E781-609A-4C6D08A1B2EE}"/>
+              </a:ext>
+            </a:extLst>
+          </p:cNvPr>
+          <p:cNvSpPr txBox="1"/>
+          <p:nvPr/>
+        </p:nvSpPr>
+        <p:spPr>
+          <a:xfrm>
+            <a:off x="124837" y="6451715"/>
+            <a:ext cx="5532120" cy="461665"/>
+          </a:xfrm>
+          <a:prstGeom prst="rect">
+            <a:avLst/>
+          </a:prstGeom>
+          <a:noFill/>
+        </p:spPr>
+        <p:txBody>
+          <a:bodyPr wrap="square">
+            <a:spAutoFit/>
+          </a:bodyPr>
+          <a:lstStyle/>
+          <a:p>
+            <a:pPr algn="l"/>
+            <a:r>
+              <a:rPr lang="th-TH" sz="2400" dirty="0">
+                <a:solidFill>
+                  <a:schemeClr val="bg1"/>
+                </a:solidFill>
+                <a:latin typeface="TH SarabunPSK" panose="020B0500040200020003" pitchFamily="34" charset="-34"/>
+                <a:cs typeface="TH SarabunPSK" panose="020B0500040200020003" pitchFamily="34" charset="-34"/>
+              </a:rPr>
+              <a:t>โดย ผศ</a:t>
+            </a:r>
+            <a:r>
+              <a:rPr lang="en-US" sz="2400" dirty="0">
+                <a:solidFill>
+                  <a:schemeClr val="bg1"/>
+                </a:solidFill>
+                <a:latin typeface="TH SarabunPSK" panose="020B0500040200020003" pitchFamily="34" charset="-34"/>
+                <a:cs typeface="TH SarabunPSK" panose="020B0500040200020003" pitchFamily="34" charset="-34"/>
+              </a:rPr>
+              <a:t>. </a:t>
+            </a:r>
+            <a:r>
+              <a:rPr lang="th-TH" sz="2400" dirty="0">
+                <a:solidFill>
+                  <a:schemeClr val="bg1"/>
+                </a:solidFill>
+                <a:latin typeface="TH SarabunPSK" panose="020B0500040200020003" pitchFamily="34" charset="-34"/>
+                <a:cs typeface="TH SarabunPSK" panose="020B0500040200020003" pitchFamily="34" charset="-34"/>
+              </a:rPr>
+              <a:t>ดร</a:t>
+            </a:r>
+            <a:r>
+              <a:rPr lang="en-US" sz="2400" dirty="0">
+                <a:solidFill>
+                  <a:schemeClr val="bg1"/>
+                </a:solidFill>
+                <a:latin typeface="TH SarabunPSK" panose="020B0500040200020003" pitchFamily="34" charset="-34"/>
+                <a:cs typeface="TH SarabunPSK" panose="020B0500040200020003" pitchFamily="34" charset="-34"/>
+              </a:rPr>
+              <a:t>.</a:t>
+            </a:r>
+            <a:r>
+              <a:rPr lang="th-TH" sz="2400" dirty="0">
+                <a:solidFill>
+                  <a:schemeClr val="bg1"/>
+                </a:solidFill>
+                <a:latin typeface="TH SarabunPSK" panose="020B0500040200020003" pitchFamily="34" charset="-34"/>
+                <a:cs typeface="TH SarabunPSK" panose="020B0500040200020003" pitchFamily="34" charset="-34"/>
+              </a:rPr>
+              <a:t>ธนพงศ์ อินทระ สาขาวิชาสถิติ มหาวิทยาลัยขอนแก่น </a:t>
+            </a:r>
+          </a:p>
+        </p:txBody>
+      </p:sp>
     </p:spTree>
     <p:extLst>
       <p:ext uri="{BB962C8B-B14F-4D97-AF65-F5344CB8AC3E}">
@@ -17762,6 +19156,88 @@
           </a:p>
         </p:txBody>
       </p:sp>
+      <p:sp>
+        <p:nvSpPr>
+          <p:cNvPr id="5" name="TextBox 4">
+            <a:extLst>
+              <a:ext uri="{FF2B5EF4-FFF2-40B4-BE49-F238E27FC236}">
+                <a16:creationId xmlns:a16="http://schemas.microsoft.com/office/drawing/2014/main" id="{C3176F6B-B52F-4509-9394-4C88F1630249}"/>
+              </a:ext>
+            </a:extLst>
+          </p:cNvPr>
+          <p:cNvSpPr txBox="1"/>
+          <p:nvPr/>
+        </p:nvSpPr>
+        <p:spPr>
+          <a:xfrm>
+            <a:off x="124837" y="6451715"/>
+            <a:ext cx="5532120" cy="461665"/>
+          </a:xfrm>
+          <a:prstGeom prst="rect">
+            <a:avLst/>
+          </a:prstGeom>
+          <a:noFill/>
+        </p:spPr>
+        <p:txBody>
+          <a:bodyPr wrap="square">
+            <a:spAutoFit/>
+          </a:bodyPr>
+          <a:lstStyle/>
+          <a:p>
+            <a:pPr algn="l"/>
+            <a:r>
+              <a:rPr lang="th-TH" sz="2400" dirty="0">
+                <a:solidFill>
+                  <a:schemeClr val="bg1"/>
+                </a:solidFill>
+                <a:latin typeface="TH SarabunPSK" panose="020B0500040200020003" pitchFamily="34" charset="-34"/>
+                <a:cs typeface="TH SarabunPSK" panose="020B0500040200020003" pitchFamily="34" charset="-34"/>
+              </a:rPr>
+              <a:t>โดย ผศ</a:t>
+            </a:r>
+            <a:r>
+              <a:rPr lang="en-US" sz="2400" dirty="0">
+                <a:solidFill>
+                  <a:schemeClr val="bg1"/>
+                </a:solidFill>
+                <a:latin typeface="TH SarabunPSK" panose="020B0500040200020003" pitchFamily="34" charset="-34"/>
+                <a:cs typeface="TH SarabunPSK" panose="020B0500040200020003" pitchFamily="34" charset="-34"/>
+              </a:rPr>
+              <a:t>. </a:t>
+            </a:r>
+            <a:r>
+              <a:rPr lang="th-TH" sz="2400" dirty="0">
+                <a:solidFill>
+                  <a:schemeClr val="bg1"/>
+                </a:solidFill>
+                <a:latin typeface="TH SarabunPSK" panose="020B0500040200020003" pitchFamily="34" charset="-34"/>
+                <a:cs typeface="TH SarabunPSK" panose="020B0500040200020003" pitchFamily="34" charset="-34"/>
+              </a:rPr>
+              <a:t>ดร</a:t>
+            </a:r>
+            <a:r>
+              <a:rPr lang="en-US" sz="2400" dirty="0">
+                <a:solidFill>
+                  <a:schemeClr val="bg1"/>
+                </a:solidFill>
+                <a:latin typeface="TH SarabunPSK" panose="020B0500040200020003" pitchFamily="34" charset="-34"/>
+                <a:cs typeface="TH SarabunPSK" panose="020B0500040200020003" pitchFamily="34" charset="-34"/>
+              </a:rPr>
+              <a:t>.</a:t>
+            </a:r>
+            <a:r>
+              <a:rPr lang="th-TH" sz="2400" dirty="0">
+                <a:solidFill>
+                  <a:schemeClr val="bg1"/>
+                </a:solidFill>
+                <a:latin typeface="TH SarabunPSK" panose="020B0500040200020003" pitchFamily="34" charset="-34"/>
+                <a:cs typeface="TH SarabunPSK" panose="020B0500040200020003" pitchFamily="34" charset="-34"/>
+              </a:rPr>
+              <a:t>ธนพงศ์ อินทระ สาขาวิชาสถิติ มหาวิทยาลัยขอนแก่น </a:t>
+            </a:r>
+          </a:p>
+        </p:txBody>
+      </p:sp>
     </p:spTree>
     <p:extLst>
       <p:ext uri="{BB962C8B-B14F-4D97-AF65-F5344CB8AC3E}">
@@ -18391,6 +19867,88 @@
           </a:p>
         </p:txBody>
       </p:sp>
+      <p:sp>
+        <p:nvSpPr>
+          <p:cNvPr id="4" name="TextBox 3">
+            <a:extLst>
+              <a:ext uri="{FF2B5EF4-FFF2-40B4-BE49-F238E27FC236}">
+                <a16:creationId xmlns:a16="http://schemas.microsoft.com/office/drawing/2014/main" id="{AB34F39B-C45F-E360-4BDF-661734C09951}"/>
+              </a:ext>
+            </a:extLst>
+          </p:cNvPr>
+          <p:cNvSpPr txBox="1"/>
+          <p:nvPr/>
+        </p:nvSpPr>
+        <p:spPr>
+          <a:xfrm>
+            <a:off x="124837" y="6451715"/>
+            <a:ext cx="5532120" cy="461665"/>
+          </a:xfrm>
+          <a:prstGeom prst="rect">
+            <a:avLst/>
+          </a:prstGeom>
+          <a:noFill/>
+        </p:spPr>
+        <p:txBody>
+          <a:bodyPr wrap="square">
+            <a:spAutoFit/>
+          </a:bodyPr>
+          <a:lstStyle/>
+          <a:p>
+            <a:pPr algn="l"/>
+            <a:r>
+              <a:rPr lang="th-TH" sz="2400" dirty="0">
+                <a:solidFill>
+                  <a:schemeClr val="bg1"/>
+                </a:solidFill>
+                <a:latin typeface="TH SarabunPSK" panose="020B0500040200020003" pitchFamily="34" charset="-34"/>
+                <a:cs typeface="TH SarabunPSK" panose="020B0500040200020003" pitchFamily="34" charset="-34"/>
+              </a:rPr>
+              <a:t>โดย ผศ</a:t>
+            </a:r>
+            <a:r>
+              <a:rPr lang="en-US" sz="2400" dirty="0">
+                <a:solidFill>
+                  <a:schemeClr val="bg1"/>
+                </a:solidFill>
+                <a:latin typeface="TH SarabunPSK" panose="020B0500040200020003" pitchFamily="34" charset="-34"/>
+                <a:cs typeface="TH SarabunPSK" panose="020B0500040200020003" pitchFamily="34" charset="-34"/>
+              </a:rPr>
+              <a:t>. </a:t>
+            </a:r>
+            <a:r>
+              <a:rPr lang="th-TH" sz="2400" dirty="0">
+                <a:solidFill>
+                  <a:schemeClr val="bg1"/>
+                </a:solidFill>
+                <a:latin typeface="TH SarabunPSK" panose="020B0500040200020003" pitchFamily="34" charset="-34"/>
+                <a:cs typeface="TH SarabunPSK" panose="020B0500040200020003" pitchFamily="34" charset="-34"/>
+              </a:rPr>
+              <a:t>ดร</a:t>
+            </a:r>
+            <a:r>
+              <a:rPr lang="en-US" sz="2400" dirty="0">
+                <a:solidFill>
+                  <a:schemeClr val="bg1"/>
+                </a:solidFill>
+                <a:latin typeface="TH SarabunPSK" panose="020B0500040200020003" pitchFamily="34" charset="-34"/>
+                <a:cs typeface="TH SarabunPSK" panose="020B0500040200020003" pitchFamily="34" charset="-34"/>
+              </a:rPr>
+              <a:t>.</a:t>
+            </a:r>
+            <a:r>
+              <a:rPr lang="th-TH" sz="2400" dirty="0">
+                <a:solidFill>
+                  <a:schemeClr val="bg1"/>
+                </a:solidFill>
+                <a:latin typeface="TH SarabunPSK" panose="020B0500040200020003" pitchFamily="34" charset="-34"/>
+                <a:cs typeface="TH SarabunPSK" panose="020B0500040200020003" pitchFamily="34" charset="-34"/>
+              </a:rPr>
+              <a:t>ธนพงศ์ อินทระ สาขาวิชาสถิติ มหาวิทยาลัยขอนแก่น </a:t>
+            </a:r>
+          </a:p>
+        </p:txBody>
+      </p:sp>
     </p:spTree>
     <p:extLst>
       <p:ext uri="{BB962C8B-B14F-4D97-AF65-F5344CB8AC3E}">
@@ -19724,6 +21282,88 @@
           </a:p>
         </p:txBody>
       </p:sp>
+      <p:sp>
+        <p:nvSpPr>
+          <p:cNvPr id="5" name="TextBox 4">
+            <a:extLst>
+              <a:ext uri="{FF2B5EF4-FFF2-40B4-BE49-F238E27FC236}">
+                <a16:creationId xmlns:a16="http://schemas.microsoft.com/office/drawing/2014/main" id="{7080839C-9C89-73CF-4EFF-BFA2233F3FFA}"/>
+              </a:ext>
+            </a:extLst>
+          </p:cNvPr>
+          <p:cNvSpPr txBox="1"/>
+          <p:nvPr/>
+        </p:nvSpPr>
+        <p:spPr>
+          <a:xfrm>
+            <a:off x="124837" y="6451715"/>
+            <a:ext cx="5532120" cy="461665"/>
+          </a:xfrm>
+          <a:prstGeom prst="rect">
+            <a:avLst/>
+          </a:prstGeom>
+          <a:noFill/>
+        </p:spPr>
+        <p:txBody>
+          <a:bodyPr wrap="square">
+            <a:spAutoFit/>
+          </a:bodyPr>
+          <a:lstStyle/>
+          <a:p>
+            <a:pPr algn="l"/>
+            <a:r>
+              <a:rPr lang="th-TH" sz="2400" dirty="0">
+                <a:solidFill>
+                  <a:schemeClr val="bg1"/>
+                </a:solidFill>
+                <a:latin typeface="TH SarabunPSK" panose="020B0500040200020003" pitchFamily="34" charset="-34"/>
+                <a:cs typeface="TH SarabunPSK" panose="020B0500040200020003" pitchFamily="34" charset="-34"/>
+              </a:rPr>
+              <a:t>โดย ผศ</a:t>
+            </a:r>
+            <a:r>
+              <a:rPr lang="en-US" sz="2400" dirty="0">
+                <a:solidFill>
+                  <a:schemeClr val="bg1"/>
+                </a:solidFill>
+                <a:latin typeface="TH SarabunPSK" panose="020B0500040200020003" pitchFamily="34" charset="-34"/>
+                <a:cs typeface="TH SarabunPSK" panose="020B0500040200020003" pitchFamily="34" charset="-34"/>
+              </a:rPr>
+              <a:t>. </a:t>
+            </a:r>
+            <a:r>
+              <a:rPr lang="th-TH" sz="2400" dirty="0">
+                <a:solidFill>
+                  <a:schemeClr val="bg1"/>
+                </a:solidFill>
+                <a:latin typeface="TH SarabunPSK" panose="020B0500040200020003" pitchFamily="34" charset="-34"/>
+                <a:cs typeface="TH SarabunPSK" panose="020B0500040200020003" pitchFamily="34" charset="-34"/>
+              </a:rPr>
+              <a:t>ดร</a:t>
+            </a:r>
+            <a:r>
+              <a:rPr lang="en-US" sz="2400" dirty="0">
+                <a:solidFill>
+                  <a:schemeClr val="bg1"/>
+                </a:solidFill>
+                <a:latin typeface="TH SarabunPSK" panose="020B0500040200020003" pitchFamily="34" charset="-34"/>
+                <a:cs typeface="TH SarabunPSK" panose="020B0500040200020003" pitchFamily="34" charset="-34"/>
+              </a:rPr>
+              <a:t>.</a:t>
+            </a:r>
+            <a:r>
+              <a:rPr lang="th-TH" sz="2400" dirty="0">
+                <a:solidFill>
+                  <a:schemeClr val="bg1"/>
+                </a:solidFill>
+                <a:latin typeface="TH SarabunPSK" panose="020B0500040200020003" pitchFamily="34" charset="-34"/>
+                <a:cs typeface="TH SarabunPSK" panose="020B0500040200020003" pitchFamily="34" charset="-34"/>
+              </a:rPr>
+              <a:t>ธนพงศ์ อินทระ สาขาวิชาสถิติ มหาวิทยาลัยขอนแก่น </a:t>
+            </a:r>
+          </a:p>
+        </p:txBody>
+      </p:sp>
     </p:spTree>
     <p:extLst>
       <p:ext uri="{BB962C8B-B14F-4D97-AF65-F5344CB8AC3E}">
@@ -20557,6 +22197,88 @@
           </a:p>
         </p:txBody>
       </p:sp>
+      <p:sp>
+        <p:nvSpPr>
+          <p:cNvPr id="4" name="TextBox 3">
+            <a:extLst>
+              <a:ext uri="{FF2B5EF4-FFF2-40B4-BE49-F238E27FC236}">
+                <a16:creationId xmlns:a16="http://schemas.microsoft.com/office/drawing/2014/main" id="{24D16056-2BEB-5A51-C926-4E2BE67F4A92}"/>
+              </a:ext>
+            </a:extLst>
+          </p:cNvPr>
+          <p:cNvSpPr txBox="1"/>
+          <p:nvPr/>
+        </p:nvSpPr>
+        <p:spPr>
+          <a:xfrm>
+            <a:off x="124837" y="6451715"/>
+            <a:ext cx="5532120" cy="461665"/>
+          </a:xfrm>
+          <a:prstGeom prst="rect">
+            <a:avLst/>
+          </a:prstGeom>
+          <a:noFill/>
+        </p:spPr>
+        <p:txBody>
+          <a:bodyPr wrap="square">
+            <a:spAutoFit/>
+          </a:bodyPr>
+          <a:lstStyle/>
+          <a:p>
+            <a:pPr algn="l"/>
+            <a:r>
+              <a:rPr lang="th-TH" sz="2400" dirty="0">
+                <a:solidFill>
+                  <a:schemeClr val="bg1"/>
+                </a:solidFill>
+                <a:latin typeface="TH SarabunPSK" panose="020B0500040200020003" pitchFamily="34" charset="-34"/>
+                <a:cs typeface="TH SarabunPSK" panose="020B0500040200020003" pitchFamily="34" charset="-34"/>
+              </a:rPr>
+              <a:t>โดย ผศ</a:t>
+            </a:r>
+            <a:r>
+              <a:rPr lang="en-US" sz="2400" dirty="0">
+                <a:solidFill>
+                  <a:schemeClr val="bg1"/>
+                </a:solidFill>
+                <a:latin typeface="TH SarabunPSK" panose="020B0500040200020003" pitchFamily="34" charset="-34"/>
+                <a:cs typeface="TH SarabunPSK" panose="020B0500040200020003" pitchFamily="34" charset="-34"/>
+              </a:rPr>
+              <a:t>. </a:t>
+            </a:r>
+            <a:r>
+              <a:rPr lang="th-TH" sz="2400" dirty="0">
+                <a:solidFill>
+                  <a:schemeClr val="bg1"/>
+                </a:solidFill>
+                <a:latin typeface="TH SarabunPSK" panose="020B0500040200020003" pitchFamily="34" charset="-34"/>
+                <a:cs typeface="TH SarabunPSK" panose="020B0500040200020003" pitchFamily="34" charset="-34"/>
+              </a:rPr>
+              <a:t>ดร</a:t>
+            </a:r>
+            <a:r>
+              <a:rPr lang="en-US" sz="2400" dirty="0">
+                <a:solidFill>
+                  <a:schemeClr val="bg1"/>
+                </a:solidFill>
+                <a:latin typeface="TH SarabunPSK" panose="020B0500040200020003" pitchFamily="34" charset="-34"/>
+                <a:cs typeface="TH SarabunPSK" panose="020B0500040200020003" pitchFamily="34" charset="-34"/>
+              </a:rPr>
+              <a:t>.</a:t>
+            </a:r>
+            <a:r>
+              <a:rPr lang="th-TH" sz="2400" dirty="0">
+                <a:solidFill>
+                  <a:schemeClr val="bg1"/>
+                </a:solidFill>
+                <a:latin typeface="TH SarabunPSK" panose="020B0500040200020003" pitchFamily="34" charset="-34"/>
+                <a:cs typeface="TH SarabunPSK" panose="020B0500040200020003" pitchFamily="34" charset="-34"/>
+              </a:rPr>
+              <a:t>ธนพงศ์ อินทระ สาขาวิชาสถิติ มหาวิทยาลัยขอนแก่น </a:t>
+            </a:r>
+          </a:p>
+        </p:txBody>
+      </p:sp>
     </p:spTree>
     <p:extLst>
       <p:ext uri="{BB962C8B-B14F-4D97-AF65-F5344CB8AC3E}">
@@ -21737,6 +23459,88 @@
           </a:p>
         </p:txBody>
       </p:sp>
+      <p:sp>
+        <p:nvSpPr>
+          <p:cNvPr id="4" name="TextBox 3">
+            <a:extLst>
+              <a:ext uri="{FF2B5EF4-FFF2-40B4-BE49-F238E27FC236}">
+                <a16:creationId xmlns:a16="http://schemas.microsoft.com/office/drawing/2014/main" id="{5B0782B0-6D69-A677-4D3E-457D034B5D25}"/>
+              </a:ext>
+            </a:extLst>
+          </p:cNvPr>
+          <p:cNvSpPr txBox="1"/>
+          <p:nvPr/>
+        </p:nvSpPr>
+        <p:spPr>
+          <a:xfrm>
+            <a:off x="124837" y="6451715"/>
+            <a:ext cx="5532120" cy="461665"/>
+          </a:xfrm>
+          <a:prstGeom prst="rect">
+            <a:avLst/>
+          </a:prstGeom>
+          <a:noFill/>
+        </p:spPr>
+        <p:txBody>
+          <a:bodyPr wrap="square">
+            <a:spAutoFit/>
+          </a:bodyPr>
+          <a:lstStyle/>
+          <a:p>
+            <a:pPr algn="l"/>
+            <a:r>
+              <a:rPr lang="th-TH" sz="2400" dirty="0">
+                <a:solidFill>
+                  <a:schemeClr val="bg1"/>
+                </a:solidFill>
+                <a:latin typeface="TH SarabunPSK" panose="020B0500040200020003" pitchFamily="34" charset="-34"/>
+                <a:cs typeface="TH SarabunPSK" panose="020B0500040200020003" pitchFamily="34" charset="-34"/>
+              </a:rPr>
+              <a:t>โดย ผศ</a:t>
+            </a:r>
+            <a:r>
+              <a:rPr lang="en-US" sz="2400" dirty="0">
+                <a:solidFill>
+                  <a:schemeClr val="bg1"/>
+                </a:solidFill>
+                <a:latin typeface="TH SarabunPSK" panose="020B0500040200020003" pitchFamily="34" charset="-34"/>
+                <a:cs typeface="TH SarabunPSK" panose="020B0500040200020003" pitchFamily="34" charset="-34"/>
+              </a:rPr>
+              <a:t>. </a:t>
+            </a:r>
+            <a:r>
+              <a:rPr lang="th-TH" sz="2400" dirty="0">
+                <a:solidFill>
+                  <a:schemeClr val="bg1"/>
+                </a:solidFill>
+                <a:latin typeface="TH SarabunPSK" panose="020B0500040200020003" pitchFamily="34" charset="-34"/>
+                <a:cs typeface="TH SarabunPSK" panose="020B0500040200020003" pitchFamily="34" charset="-34"/>
+              </a:rPr>
+              <a:t>ดร</a:t>
+            </a:r>
+            <a:r>
+              <a:rPr lang="en-US" sz="2400" dirty="0">
+                <a:solidFill>
+                  <a:schemeClr val="bg1"/>
+                </a:solidFill>
+                <a:latin typeface="TH SarabunPSK" panose="020B0500040200020003" pitchFamily="34" charset="-34"/>
+                <a:cs typeface="TH SarabunPSK" panose="020B0500040200020003" pitchFamily="34" charset="-34"/>
+              </a:rPr>
+              <a:t>.</a:t>
+            </a:r>
+            <a:r>
+              <a:rPr lang="th-TH" sz="2400" dirty="0">
+                <a:solidFill>
+                  <a:schemeClr val="bg1"/>
+                </a:solidFill>
+                <a:latin typeface="TH SarabunPSK" panose="020B0500040200020003" pitchFamily="34" charset="-34"/>
+                <a:cs typeface="TH SarabunPSK" panose="020B0500040200020003" pitchFamily="34" charset="-34"/>
+              </a:rPr>
+              <a:t>ธนพงศ์ อินทระ สาขาวิชาสถิติ มหาวิทยาลัยขอนแก่น </a:t>
+            </a:r>
+          </a:p>
+        </p:txBody>
+      </p:sp>
     </p:spTree>
     <p:extLst>
       <p:ext uri="{BB962C8B-B14F-4D97-AF65-F5344CB8AC3E}">
@@ -22490,6 +24294,88 @@
           </a:p>
         </p:txBody>
       </p:sp>
+      <p:sp>
+        <p:nvSpPr>
+          <p:cNvPr id="4" name="TextBox 3">
+            <a:extLst>
+              <a:ext uri="{FF2B5EF4-FFF2-40B4-BE49-F238E27FC236}">
+                <a16:creationId xmlns:a16="http://schemas.microsoft.com/office/drawing/2014/main" id="{C6488245-1761-655C-4109-6C64A4ECB987}"/>
+              </a:ext>
+            </a:extLst>
+          </p:cNvPr>
+          <p:cNvSpPr txBox="1"/>
+          <p:nvPr/>
+        </p:nvSpPr>
+        <p:spPr>
+          <a:xfrm>
+            <a:off x="124837" y="6451715"/>
+            <a:ext cx="5532120" cy="461665"/>
+          </a:xfrm>
+          <a:prstGeom prst="rect">
+            <a:avLst/>
+          </a:prstGeom>
+          <a:noFill/>
+        </p:spPr>
+        <p:txBody>
+          <a:bodyPr wrap="square">
+            <a:spAutoFit/>
+          </a:bodyPr>
+          <a:lstStyle/>
+          <a:p>
+            <a:pPr algn="l"/>
+            <a:r>
+              <a:rPr lang="th-TH" sz="2400" dirty="0">
+                <a:solidFill>
+                  <a:schemeClr val="bg1"/>
+                </a:solidFill>
+                <a:latin typeface="TH SarabunPSK" panose="020B0500040200020003" pitchFamily="34" charset="-34"/>
+                <a:cs typeface="TH SarabunPSK" panose="020B0500040200020003" pitchFamily="34" charset="-34"/>
+              </a:rPr>
+              <a:t>โดย ผศ</a:t>
+            </a:r>
+            <a:r>
+              <a:rPr lang="en-US" sz="2400" dirty="0">
+                <a:solidFill>
+                  <a:schemeClr val="bg1"/>
+                </a:solidFill>
+                <a:latin typeface="TH SarabunPSK" panose="020B0500040200020003" pitchFamily="34" charset="-34"/>
+                <a:cs typeface="TH SarabunPSK" panose="020B0500040200020003" pitchFamily="34" charset="-34"/>
+              </a:rPr>
+              <a:t>. </a:t>
+            </a:r>
+            <a:r>
+              <a:rPr lang="th-TH" sz="2400" dirty="0">
+                <a:solidFill>
+                  <a:schemeClr val="bg1"/>
+                </a:solidFill>
+                <a:latin typeface="TH SarabunPSK" panose="020B0500040200020003" pitchFamily="34" charset="-34"/>
+                <a:cs typeface="TH SarabunPSK" panose="020B0500040200020003" pitchFamily="34" charset="-34"/>
+              </a:rPr>
+              <a:t>ดร</a:t>
+            </a:r>
+            <a:r>
+              <a:rPr lang="en-US" sz="2400" dirty="0">
+                <a:solidFill>
+                  <a:schemeClr val="bg1"/>
+                </a:solidFill>
+                <a:latin typeface="TH SarabunPSK" panose="020B0500040200020003" pitchFamily="34" charset="-34"/>
+                <a:cs typeface="TH SarabunPSK" panose="020B0500040200020003" pitchFamily="34" charset="-34"/>
+              </a:rPr>
+              <a:t>.</a:t>
+            </a:r>
+            <a:r>
+              <a:rPr lang="th-TH" sz="2400" dirty="0">
+                <a:solidFill>
+                  <a:schemeClr val="bg1"/>
+                </a:solidFill>
+                <a:latin typeface="TH SarabunPSK" panose="020B0500040200020003" pitchFamily="34" charset="-34"/>
+                <a:cs typeface="TH SarabunPSK" panose="020B0500040200020003" pitchFamily="34" charset="-34"/>
+              </a:rPr>
+              <a:t>ธนพงศ์ อินทระ สาขาวิชาสถิติ มหาวิทยาลัยขอนแก่น </a:t>
+            </a:r>
+          </a:p>
+        </p:txBody>
+      </p:sp>
     </p:spTree>
     <p:extLst>
       <p:ext uri="{BB962C8B-B14F-4D97-AF65-F5344CB8AC3E}">
@@ -23592,6 +25478,88 @@
           </a:p>
         </p:txBody>
       </p:sp>
+      <p:sp>
+        <p:nvSpPr>
+          <p:cNvPr id="4" name="TextBox 3">
+            <a:extLst>
+              <a:ext uri="{FF2B5EF4-FFF2-40B4-BE49-F238E27FC236}">
+                <a16:creationId xmlns:a16="http://schemas.microsoft.com/office/drawing/2014/main" id="{FC57F8C2-6782-0E77-48CA-641D0BCF756D}"/>
+              </a:ext>
+            </a:extLst>
+          </p:cNvPr>
+          <p:cNvSpPr txBox="1"/>
+          <p:nvPr/>
+        </p:nvSpPr>
+        <p:spPr>
+          <a:xfrm>
+            <a:off x="124837" y="6451715"/>
+            <a:ext cx="5532120" cy="461665"/>
+          </a:xfrm>
+          <a:prstGeom prst="rect">
+            <a:avLst/>
+          </a:prstGeom>
+          <a:noFill/>
+        </p:spPr>
+        <p:txBody>
+          <a:bodyPr wrap="square">
+            <a:spAutoFit/>
+          </a:bodyPr>
+          <a:lstStyle/>
+          <a:p>
+            <a:pPr algn="l"/>
+            <a:r>
+              <a:rPr lang="th-TH" sz="2400" dirty="0">
+                <a:solidFill>
+                  <a:schemeClr val="bg1"/>
+                </a:solidFill>
+                <a:latin typeface="TH SarabunPSK" panose="020B0500040200020003" pitchFamily="34" charset="-34"/>
+                <a:cs typeface="TH SarabunPSK" panose="020B0500040200020003" pitchFamily="34" charset="-34"/>
+              </a:rPr>
+              <a:t>โดย ผศ</a:t>
+            </a:r>
+            <a:r>
+              <a:rPr lang="en-US" sz="2400" dirty="0">
+                <a:solidFill>
+                  <a:schemeClr val="bg1"/>
+                </a:solidFill>
+                <a:latin typeface="TH SarabunPSK" panose="020B0500040200020003" pitchFamily="34" charset="-34"/>
+                <a:cs typeface="TH SarabunPSK" panose="020B0500040200020003" pitchFamily="34" charset="-34"/>
+              </a:rPr>
+              <a:t>. </a:t>
+            </a:r>
+            <a:r>
+              <a:rPr lang="th-TH" sz="2400" dirty="0">
+                <a:solidFill>
+                  <a:schemeClr val="bg1"/>
+                </a:solidFill>
+                <a:latin typeface="TH SarabunPSK" panose="020B0500040200020003" pitchFamily="34" charset="-34"/>
+                <a:cs typeface="TH SarabunPSK" panose="020B0500040200020003" pitchFamily="34" charset="-34"/>
+              </a:rPr>
+              <a:t>ดร</a:t>
+            </a:r>
+            <a:r>
+              <a:rPr lang="en-US" sz="2400" dirty="0">
+                <a:solidFill>
+                  <a:schemeClr val="bg1"/>
+                </a:solidFill>
+                <a:latin typeface="TH SarabunPSK" panose="020B0500040200020003" pitchFamily="34" charset="-34"/>
+                <a:cs typeface="TH SarabunPSK" panose="020B0500040200020003" pitchFamily="34" charset="-34"/>
+              </a:rPr>
+              <a:t>.</a:t>
+            </a:r>
+            <a:r>
+              <a:rPr lang="th-TH" sz="2400" dirty="0">
+                <a:solidFill>
+                  <a:schemeClr val="bg1"/>
+                </a:solidFill>
+                <a:latin typeface="TH SarabunPSK" panose="020B0500040200020003" pitchFamily="34" charset="-34"/>
+                <a:cs typeface="TH SarabunPSK" panose="020B0500040200020003" pitchFamily="34" charset="-34"/>
+              </a:rPr>
+              <a:t>ธนพงศ์ อินทระ สาขาวิชาสถิติ มหาวิทยาลัยขอนแก่น </a:t>
+            </a:r>
+          </a:p>
+        </p:txBody>
+      </p:sp>
     </p:spTree>
     <p:extLst>
       <p:ext uri="{BB962C8B-B14F-4D97-AF65-F5344CB8AC3E}">
@@ -24376,6 +26344,88 @@
           </a:p>
         </p:txBody>
       </p:sp>
+      <p:sp>
+        <p:nvSpPr>
+          <p:cNvPr id="4" name="TextBox 3">
+            <a:extLst>
+              <a:ext uri="{FF2B5EF4-FFF2-40B4-BE49-F238E27FC236}">
+                <a16:creationId xmlns:a16="http://schemas.microsoft.com/office/drawing/2014/main" id="{CF8EFA98-BA0F-0A67-FC96-D7A58A540DAF}"/>
+              </a:ext>
+            </a:extLst>
+          </p:cNvPr>
+          <p:cNvSpPr txBox="1"/>
+          <p:nvPr/>
+        </p:nvSpPr>
+        <p:spPr>
+          <a:xfrm>
+            <a:off x="124837" y="6451715"/>
+            <a:ext cx="5532120" cy="461665"/>
+          </a:xfrm>
+          <a:prstGeom prst="rect">
+            <a:avLst/>
+          </a:prstGeom>
+          <a:noFill/>
+        </p:spPr>
+        <p:txBody>
+          <a:bodyPr wrap="square">
+            <a:spAutoFit/>
+          </a:bodyPr>
+          <a:lstStyle/>
+          <a:p>
+            <a:pPr algn="l"/>
+            <a:r>
+              <a:rPr lang="th-TH" sz="2400" dirty="0">
+                <a:solidFill>
+                  <a:schemeClr val="bg1"/>
+                </a:solidFill>
+                <a:latin typeface="TH SarabunPSK" panose="020B0500040200020003" pitchFamily="34" charset="-34"/>
+                <a:cs typeface="TH SarabunPSK" panose="020B0500040200020003" pitchFamily="34" charset="-34"/>
+              </a:rPr>
+              <a:t>โดย ผศ</a:t>
+            </a:r>
+            <a:r>
+              <a:rPr lang="en-US" sz="2400" dirty="0">
+                <a:solidFill>
+                  <a:schemeClr val="bg1"/>
+                </a:solidFill>
+                <a:latin typeface="TH SarabunPSK" panose="020B0500040200020003" pitchFamily="34" charset="-34"/>
+                <a:cs typeface="TH SarabunPSK" panose="020B0500040200020003" pitchFamily="34" charset="-34"/>
+              </a:rPr>
+              <a:t>. </a:t>
+            </a:r>
+            <a:r>
+              <a:rPr lang="th-TH" sz="2400" dirty="0">
+                <a:solidFill>
+                  <a:schemeClr val="bg1"/>
+                </a:solidFill>
+                <a:latin typeface="TH SarabunPSK" panose="020B0500040200020003" pitchFamily="34" charset="-34"/>
+                <a:cs typeface="TH SarabunPSK" panose="020B0500040200020003" pitchFamily="34" charset="-34"/>
+              </a:rPr>
+              <a:t>ดร</a:t>
+            </a:r>
+            <a:r>
+              <a:rPr lang="en-US" sz="2400" dirty="0">
+                <a:solidFill>
+                  <a:schemeClr val="bg1"/>
+                </a:solidFill>
+                <a:latin typeface="TH SarabunPSK" panose="020B0500040200020003" pitchFamily="34" charset="-34"/>
+                <a:cs typeface="TH SarabunPSK" panose="020B0500040200020003" pitchFamily="34" charset="-34"/>
+              </a:rPr>
+              <a:t>.</a:t>
+            </a:r>
+            <a:r>
+              <a:rPr lang="th-TH" sz="2400" dirty="0">
+                <a:solidFill>
+                  <a:schemeClr val="bg1"/>
+                </a:solidFill>
+                <a:latin typeface="TH SarabunPSK" panose="020B0500040200020003" pitchFamily="34" charset="-34"/>
+                <a:cs typeface="TH SarabunPSK" panose="020B0500040200020003" pitchFamily="34" charset="-34"/>
+              </a:rPr>
+              <a:t>ธนพงศ์ อินทระ สาขาวิชาสถิติ มหาวิทยาลัยขอนแก่น </a:t>
+            </a:r>
+          </a:p>
+        </p:txBody>
+      </p:sp>
     </p:spTree>
     <p:extLst>
       <p:ext uri="{BB962C8B-B14F-4D97-AF65-F5344CB8AC3E}">
@@ -25295,6 +27345,88 @@
           </a:p>
         </p:txBody>
       </p:sp>
+      <p:sp>
+        <p:nvSpPr>
+          <p:cNvPr id="5" name="TextBox 4">
+            <a:extLst>
+              <a:ext uri="{FF2B5EF4-FFF2-40B4-BE49-F238E27FC236}">
+                <a16:creationId xmlns:a16="http://schemas.microsoft.com/office/drawing/2014/main" id="{AFC2C29E-00AC-D9C4-A4D5-B4183DCADF0F}"/>
+              </a:ext>
+            </a:extLst>
+          </p:cNvPr>
+          <p:cNvSpPr txBox="1"/>
+          <p:nvPr/>
+        </p:nvSpPr>
+        <p:spPr>
+          <a:xfrm>
+            <a:off x="124837" y="6451715"/>
+            <a:ext cx="5532120" cy="461665"/>
+          </a:xfrm>
+          <a:prstGeom prst="rect">
+            <a:avLst/>
+          </a:prstGeom>
+          <a:noFill/>
+        </p:spPr>
+        <p:txBody>
+          <a:bodyPr wrap="square">
+            <a:spAutoFit/>
+          </a:bodyPr>
+          <a:lstStyle/>
+          <a:p>
+            <a:pPr algn="l"/>
+            <a:r>
+              <a:rPr lang="th-TH" sz="2400" dirty="0">
+                <a:solidFill>
+                  <a:schemeClr val="bg1"/>
+                </a:solidFill>
+                <a:latin typeface="TH SarabunPSK" panose="020B0500040200020003" pitchFamily="34" charset="-34"/>
+                <a:cs typeface="TH SarabunPSK" panose="020B0500040200020003" pitchFamily="34" charset="-34"/>
+              </a:rPr>
+              <a:t>โดย ผศ</a:t>
+            </a:r>
+            <a:r>
+              <a:rPr lang="en-US" sz="2400" dirty="0">
+                <a:solidFill>
+                  <a:schemeClr val="bg1"/>
+                </a:solidFill>
+                <a:latin typeface="TH SarabunPSK" panose="020B0500040200020003" pitchFamily="34" charset="-34"/>
+                <a:cs typeface="TH SarabunPSK" panose="020B0500040200020003" pitchFamily="34" charset="-34"/>
+              </a:rPr>
+              <a:t>. </a:t>
+            </a:r>
+            <a:r>
+              <a:rPr lang="th-TH" sz="2400" dirty="0">
+                <a:solidFill>
+                  <a:schemeClr val="bg1"/>
+                </a:solidFill>
+                <a:latin typeface="TH SarabunPSK" panose="020B0500040200020003" pitchFamily="34" charset="-34"/>
+                <a:cs typeface="TH SarabunPSK" panose="020B0500040200020003" pitchFamily="34" charset="-34"/>
+              </a:rPr>
+              <a:t>ดร</a:t>
+            </a:r>
+            <a:r>
+              <a:rPr lang="en-US" sz="2400" dirty="0">
+                <a:solidFill>
+                  <a:schemeClr val="bg1"/>
+                </a:solidFill>
+                <a:latin typeface="TH SarabunPSK" panose="020B0500040200020003" pitchFamily="34" charset="-34"/>
+                <a:cs typeface="TH SarabunPSK" panose="020B0500040200020003" pitchFamily="34" charset="-34"/>
+              </a:rPr>
+              <a:t>.</a:t>
+            </a:r>
+            <a:r>
+              <a:rPr lang="th-TH" sz="2400" dirty="0">
+                <a:solidFill>
+                  <a:schemeClr val="bg1"/>
+                </a:solidFill>
+                <a:latin typeface="TH SarabunPSK" panose="020B0500040200020003" pitchFamily="34" charset="-34"/>
+                <a:cs typeface="TH SarabunPSK" panose="020B0500040200020003" pitchFamily="34" charset="-34"/>
+              </a:rPr>
+              <a:t>ธนพงศ์ อินทระ สาขาวิชาสถิติ มหาวิทยาลัยขอนแก่น </a:t>
+            </a:r>
+          </a:p>
+        </p:txBody>
+      </p:sp>
     </p:spTree>
     <p:extLst>
       <p:ext uri="{BB962C8B-B14F-4D97-AF65-F5344CB8AC3E}">
@@ -26123,6 +28255,88 @@
           </a:p>
         </p:txBody>
       </p:sp>
+      <p:sp>
+        <p:nvSpPr>
+          <p:cNvPr id="5" name="TextBox 4">
+            <a:extLst>
+              <a:ext uri="{FF2B5EF4-FFF2-40B4-BE49-F238E27FC236}">
+                <a16:creationId xmlns:a16="http://schemas.microsoft.com/office/drawing/2014/main" id="{A81B4D25-FA7F-64A4-B02A-1A371BD6FCE7}"/>
+              </a:ext>
+            </a:extLst>
+          </p:cNvPr>
+          <p:cNvSpPr txBox="1"/>
+          <p:nvPr/>
+        </p:nvSpPr>
+        <p:spPr>
+          <a:xfrm>
+            <a:off x="124837" y="6451715"/>
+            <a:ext cx="5532120" cy="461665"/>
+          </a:xfrm>
+          <a:prstGeom prst="rect">
+            <a:avLst/>
+          </a:prstGeom>
+          <a:noFill/>
+        </p:spPr>
+        <p:txBody>
+          <a:bodyPr wrap="square">
+            <a:spAutoFit/>
+          </a:bodyPr>
+          <a:lstStyle/>
+          <a:p>
+            <a:pPr algn="l"/>
+            <a:r>
+              <a:rPr lang="th-TH" sz="2400" dirty="0">
+                <a:solidFill>
+                  <a:schemeClr val="bg1"/>
+                </a:solidFill>
+                <a:latin typeface="TH SarabunPSK" panose="020B0500040200020003" pitchFamily="34" charset="-34"/>
+                <a:cs typeface="TH SarabunPSK" panose="020B0500040200020003" pitchFamily="34" charset="-34"/>
+              </a:rPr>
+              <a:t>โดย ผศ</a:t>
+            </a:r>
+            <a:r>
+              <a:rPr lang="en-US" sz="2400" dirty="0">
+                <a:solidFill>
+                  <a:schemeClr val="bg1"/>
+                </a:solidFill>
+                <a:latin typeface="TH SarabunPSK" panose="020B0500040200020003" pitchFamily="34" charset="-34"/>
+                <a:cs typeface="TH SarabunPSK" panose="020B0500040200020003" pitchFamily="34" charset="-34"/>
+              </a:rPr>
+              <a:t>. </a:t>
+            </a:r>
+            <a:r>
+              <a:rPr lang="th-TH" sz="2400" dirty="0">
+                <a:solidFill>
+                  <a:schemeClr val="bg1"/>
+                </a:solidFill>
+                <a:latin typeface="TH SarabunPSK" panose="020B0500040200020003" pitchFamily="34" charset="-34"/>
+                <a:cs typeface="TH SarabunPSK" panose="020B0500040200020003" pitchFamily="34" charset="-34"/>
+              </a:rPr>
+              <a:t>ดร</a:t>
+            </a:r>
+            <a:r>
+              <a:rPr lang="en-US" sz="2400" dirty="0">
+                <a:solidFill>
+                  <a:schemeClr val="bg1"/>
+                </a:solidFill>
+                <a:latin typeface="TH SarabunPSK" panose="020B0500040200020003" pitchFamily="34" charset="-34"/>
+                <a:cs typeface="TH SarabunPSK" panose="020B0500040200020003" pitchFamily="34" charset="-34"/>
+              </a:rPr>
+              <a:t>.</a:t>
+            </a:r>
+            <a:r>
+              <a:rPr lang="th-TH" sz="2400" dirty="0">
+                <a:solidFill>
+                  <a:schemeClr val="bg1"/>
+                </a:solidFill>
+                <a:latin typeface="TH SarabunPSK" panose="020B0500040200020003" pitchFamily="34" charset="-34"/>
+                <a:cs typeface="TH SarabunPSK" panose="020B0500040200020003" pitchFamily="34" charset="-34"/>
+              </a:rPr>
+              <a:t>ธนพงศ์ อินทระ สาขาวิชาสถิติ มหาวิทยาลัยขอนแก่น </a:t>
+            </a:r>
+          </a:p>
+        </p:txBody>
+      </p:sp>
     </p:spTree>
     <p:extLst>
       <p:ext uri="{BB962C8B-B14F-4D97-AF65-F5344CB8AC3E}">
@@ -26899,6 +29113,88 @@
           </a:p>
         </p:txBody>
       </p:sp>
+      <p:sp>
+        <p:nvSpPr>
+          <p:cNvPr id="5" name="TextBox 4">
+            <a:extLst>
+              <a:ext uri="{FF2B5EF4-FFF2-40B4-BE49-F238E27FC236}">
+                <a16:creationId xmlns:a16="http://schemas.microsoft.com/office/drawing/2014/main" id="{2EC2F7AE-382C-A0E2-4684-E1BE4BDEDC18}"/>
+              </a:ext>
+            </a:extLst>
+          </p:cNvPr>
+          <p:cNvSpPr txBox="1"/>
+          <p:nvPr/>
+        </p:nvSpPr>
+        <p:spPr>
+          <a:xfrm>
+            <a:off x="124837" y="6451715"/>
+            <a:ext cx="5532120" cy="461665"/>
+          </a:xfrm>
+          <a:prstGeom prst="rect">
+            <a:avLst/>
+          </a:prstGeom>
+          <a:noFill/>
+        </p:spPr>
+        <p:txBody>
+          <a:bodyPr wrap="square">
+            <a:spAutoFit/>
+          </a:bodyPr>
+          <a:lstStyle/>
+          <a:p>
+            <a:pPr algn="l"/>
+            <a:r>
+              <a:rPr lang="th-TH" sz="2400" dirty="0">
+                <a:solidFill>
+                  <a:schemeClr val="bg1"/>
+                </a:solidFill>
+                <a:latin typeface="TH SarabunPSK" panose="020B0500040200020003" pitchFamily="34" charset="-34"/>
+                <a:cs typeface="TH SarabunPSK" panose="020B0500040200020003" pitchFamily="34" charset="-34"/>
+              </a:rPr>
+              <a:t>โดย ผศ</a:t>
+            </a:r>
+            <a:r>
+              <a:rPr lang="en-US" sz="2400" dirty="0">
+                <a:solidFill>
+                  <a:schemeClr val="bg1"/>
+                </a:solidFill>
+                <a:latin typeface="TH SarabunPSK" panose="020B0500040200020003" pitchFamily="34" charset="-34"/>
+                <a:cs typeface="TH SarabunPSK" panose="020B0500040200020003" pitchFamily="34" charset="-34"/>
+              </a:rPr>
+              <a:t>. </a:t>
+            </a:r>
+            <a:r>
+              <a:rPr lang="th-TH" sz="2400" dirty="0">
+                <a:solidFill>
+                  <a:schemeClr val="bg1"/>
+                </a:solidFill>
+                <a:latin typeface="TH SarabunPSK" panose="020B0500040200020003" pitchFamily="34" charset="-34"/>
+                <a:cs typeface="TH SarabunPSK" panose="020B0500040200020003" pitchFamily="34" charset="-34"/>
+              </a:rPr>
+              <a:t>ดร</a:t>
+            </a:r>
+            <a:r>
+              <a:rPr lang="en-US" sz="2400" dirty="0">
+                <a:solidFill>
+                  <a:schemeClr val="bg1"/>
+                </a:solidFill>
+                <a:latin typeface="TH SarabunPSK" panose="020B0500040200020003" pitchFamily="34" charset="-34"/>
+                <a:cs typeface="TH SarabunPSK" panose="020B0500040200020003" pitchFamily="34" charset="-34"/>
+              </a:rPr>
+              <a:t>.</a:t>
+            </a:r>
+            <a:r>
+              <a:rPr lang="th-TH" sz="2400" dirty="0">
+                <a:solidFill>
+                  <a:schemeClr val="bg1"/>
+                </a:solidFill>
+                <a:latin typeface="TH SarabunPSK" panose="020B0500040200020003" pitchFamily="34" charset="-34"/>
+                <a:cs typeface="TH SarabunPSK" panose="020B0500040200020003" pitchFamily="34" charset="-34"/>
+              </a:rPr>
+              <a:t>ธนพงศ์ อินทระ สาขาวิชาสถิติ มหาวิทยาลัยขอนแก่น </a:t>
+            </a:r>
+          </a:p>
+        </p:txBody>
+      </p:sp>
     </p:spTree>
     <p:extLst>
       <p:ext uri="{BB962C8B-B14F-4D97-AF65-F5344CB8AC3E}">
@@ -27750,6 +30046,88 @@
           </a:p>
         </p:txBody>
       </p:sp>
+      <p:sp>
+        <p:nvSpPr>
+          <p:cNvPr id="5" name="TextBox 4">
+            <a:extLst>
+              <a:ext uri="{FF2B5EF4-FFF2-40B4-BE49-F238E27FC236}">
+                <a16:creationId xmlns:a16="http://schemas.microsoft.com/office/drawing/2014/main" id="{E0CC1551-4F9D-B189-5477-BE6E2020DC8E}"/>
+              </a:ext>
+            </a:extLst>
+          </p:cNvPr>
+          <p:cNvSpPr txBox="1"/>
+          <p:nvPr/>
+        </p:nvSpPr>
+        <p:spPr>
+          <a:xfrm>
+            <a:off x="124837" y="6451715"/>
+            <a:ext cx="5532120" cy="461665"/>
+          </a:xfrm>
+          <a:prstGeom prst="rect">
+            <a:avLst/>
+          </a:prstGeom>
+          <a:noFill/>
+        </p:spPr>
+        <p:txBody>
+          <a:bodyPr wrap="square">
+            <a:spAutoFit/>
+          </a:bodyPr>
+          <a:lstStyle/>
+          <a:p>
+            <a:pPr algn="l"/>
+            <a:r>
+              <a:rPr lang="th-TH" sz="2400" dirty="0">
+                <a:solidFill>
+                  <a:schemeClr val="bg1"/>
+                </a:solidFill>
+                <a:latin typeface="TH SarabunPSK" panose="020B0500040200020003" pitchFamily="34" charset="-34"/>
+                <a:cs typeface="TH SarabunPSK" panose="020B0500040200020003" pitchFamily="34" charset="-34"/>
+              </a:rPr>
+              <a:t>โดย ผศ</a:t>
+            </a:r>
+            <a:r>
+              <a:rPr lang="en-US" sz="2400" dirty="0">
+                <a:solidFill>
+                  <a:schemeClr val="bg1"/>
+                </a:solidFill>
+                <a:latin typeface="TH SarabunPSK" panose="020B0500040200020003" pitchFamily="34" charset="-34"/>
+                <a:cs typeface="TH SarabunPSK" panose="020B0500040200020003" pitchFamily="34" charset="-34"/>
+              </a:rPr>
+              <a:t>. </a:t>
+            </a:r>
+            <a:r>
+              <a:rPr lang="th-TH" sz="2400" dirty="0">
+                <a:solidFill>
+                  <a:schemeClr val="bg1"/>
+                </a:solidFill>
+                <a:latin typeface="TH SarabunPSK" panose="020B0500040200020003" pitchFamily="34" charset="-34"/>
+                <a:cs typeface="TH SarabunPSK" panose="020B0500040200020003" pitchFamily="34" charset="-34"/>
+              </a:rPr>
+              <a:t>ดร</a:t>
+            </a:r>
+            <a:r>
+              <a:rPr lang="en-US" sz="2400" dirty="0">
+                <a:solidFill>
+                  <a:schemeClr val="bg1"/>
+                </a:solidFill>
+                <a:latin typeface="TH SarabunPSK" panose="020B0500040200020003" pitchFamily="34" charset="-34"/>
+                <a:cs typeface="TH SarabunPSK" panose="020B0500040200020003" pitchFamily="34" charset="-34"/>
+              </a:rPr>
+              <a:t>.</a:t>
+            </a:r>
+            <a:r>
+              <a:rPr lang="th-TH" sz="2400" dirty="0">
+                <a:solidFill>
+                  <a:schemeClr val="bg1"/>
+                </a:solidFill>
+                <a:latin typeface="TH SarabunPSK" panose="020B0500040200020003" pitchFamily="34" charset="-34"/>
+                <a:cs typeface="TH SarabunPSK" panose="020B0500040200020003" pitchFamily="34" charset="-34"/>
+              </a:rPr>
+              <a:t>ธนพงศ์ อินทระ สาขาวิชาสถิติ มหาวิทยาลัยขอนแก่น </a:t>
+            </a:r>
+          </a:p>
+        </p:txBody>
+      </p:sp>
     </p:spTree>
     <p:extLst>
       <p:ext uri="{BB962C8B-B14F-4D97-AF65-F5344CB8AC3E}">
@@ -28255,6 +30633,88 @@
           </a:prstGeom>
         </p:spPr>
       </p:pic>
+      <p:sp>
+        <p:nvSpPr>
+          <p:cNvPr id="3" name="TextBox 2">
+            <a:extLst>
+              <a:ext uri="{FF2B5EF4-FFF2-40B4-BE49-F238E27FC236}">
+                <a16:creationId xmlns:a16="http://schemas.microsoft.com/office/drawing/2014/main" id="{AD8FFA1B-7A8A-3AE4-B28F-52F46AB44AC3}"/>
+              </a:ext>
+            </a:extLst>
+          </p:cNvPr>
+          <p:cNvSpPr txBox="1"/>
+          <p:nvPr/>
+        </p:nvSpPr>
+        <p:spPr>
+          <a:xfrm>
+            <a:off x="124837" y="6451715"/>
+            <a:ext cx="5532120" cy="461665"/>
+          </a:xfrm>
+          <a:prstGeom prst="rect">
+            <a:avLst/>
+          </a:prstGeom>
+          <a:noFill/>
+        </p:spPr>
+        <p:txBody>
+          <a:bodyPr wrap="square">
+            <a:spAutoFit/>
+          </a:bodyPr>
+          <a:lstStyle/>
+          <a:p>
+            <a:pPr algn="l"/>
+            <a:r>
+              <a:rPr lang="th-TH" sz="2400" dirty="0">
+                <a:solidFill>
+                  <a:schemeClr val="bg1"/>
+                </a:solidFill>
+                <a:latin typeface="TH SarabunPSK" panose="020B0500040200020003" pitchFamily="34" charset="-34"/>
+                <a:cs typeface="TH SarabunPSK" panose="020B0500040200020003" pitchFamily="34" charset="-34"/>
+              </a:rPr>
+              <a:t>โดย ผศ</a:t>
+            </a:r>
+            <a:r>
+              <a:rPr lang="en-US" sz="2400" dirty="0">
+                <a:solidFill>
+                  <a:schemeClr val="bg1"/>
+                </a:solidFill>
+                <a:latin typeface="TH SarabunPSK" panose="020B0500040200020003" pitchFamily="34" charset="-34"/>
+                <a:cs typeface="TH SarabunPSK" panose="020B0500040200020003" pitchFamily="34" charset="-34"/>
+              </a:rPr>
+              <a:t>. </a:t>
+            </a:r>
+            <a:r>
+              <a:rPr lang="th-TH" sz="2400" dirty="0">
+                <a:solidFill>
+                  <a:schemeClr val="bg1"/>
+                </a:solidFill>
+                <a:latin typeface="TH SarabunPSK" panose="020B0500040200020003" pitchFamily="34" charset="-34"/>
+                <a:cs typeface="TH SarabunPSK" panose="020B0500040200020003" pitchFamily="34" charset="-34"/>
+              </a:rPr>
+              <a:t>ดร</a:t>
+            </a:r>
+            <a:r>
+              <a:rPr lang="en-US" sz="2400" dirty="0">
+                <a:solidFill>
+                  <a:schemeClr val="bg1"/>
+                </a:solidFill>
+                <a:latin typeface="TH SarabunPSK" panose="020B0500040200020003" pitchFamily="34" charset="-34"/>
+                <a:cs typeface="TH SarabunPSK" panose="020B0500040200020003" pitchFamily="34" charset="-34"/>
+              </a:rPr>
+              <a:t>.</a:t>
+            </a:r>
+            <a:r>
+              <a:rPr lang="th-TH" sz="2400" dirty="0">
+                <a:solidFill>
+                  <a:schemeClr val="bg1"/>
+                </a:solidFill>
+                <a:latin typeface="TH SarabunPSK" panose="020B0500040200020003" pitchFamily="34" charset="-34"/>
+                <a:cs typeface="TH SarabunPSK" panose="020B0500040200020003" pitchFamily="34" charset="-34"/>
+              </a:rPr>
+              <a:t>ธนพงศ์ อินทระ สาขาวิชาสถิติ มหาวิทยาลัยขอนแก่น </a:t>
+            </a:r>
+          </a:p>
+        </p:txBody>
+      </p:sp>
     </p:spTree>
     <p:extLst>
       <p:ext uri="{BB962C8B-B14F-4D97-AF65-F5344CB8AC3E}">
@@ -29826,6 +32286,88 @@
           </a:p>
         </p:txBody>
       </p:sp>
+      <p:sp>
+        <p:nvSpPr>
+          <p:cNvPr id="4" name="TextBox 3">
+            <a:extLst>
+              <a:ext uri="{FF2B5EF4-FFF2-40B4-BE49-F238E27FC236}">
+                <a16:creationId xmlns:a16="http://schemas.microsoft.com/office/drawing/2014/main" id="{6FF3F481-EC8D-8C15-0AF5-C21A099EC3B5}"/>
+              </a:ext>
+            </a:extLst>
+          </p:cNvPr>
+          <p:cNvSpPr txBox="1"/>
+          <p:nvPr/>
+        </p:nvSpPr>
+        <p:spPr>
+          <a:xfrm>
+            <a:off x="124837" y="6451715"/>
+            <a:ext cx="5532120" cy="461665"/>
+          </a:xfrm>
+          <a:prstGeom prst="rect">
+            <a:avLst/>
+          </a:prstGeom>
+          <a:noFill/>
+        </p:spPr>
+        <p:txBody>
+          <a:bodyPr wrap="square">
+            <a:spAutoFit/>
+          </a:bodyPr>
+          <a:lstStyle/>
+          <a:p>
+            <a:pPr algn="l"/>
+            <a:r>
+              <a:rPr lang="th-TH" sz="2400" dirty="0">
+                <a:solidFill>
+                  <a:schemeClr val="bg1"/>
+                </a:solidFill>
+                <a:latin typeface="TH SarabunPSK" panose="020B0500040200020003" pitchFamily="34" charset="-34"/>
+                <a:cs typeface="TH SarabunPSK" panose="020B0500040200020003" pitchFamily="34" charset="-34"/>
+              </a:rPr>
+              <a:t>โดย ผศ</a:t>
+            </a:r>
+            <a:r>
+              <a:rPr lang="en-US" sz="2400" dirty="0">
+                <a:solidFill>
+                  <a:schemeClr val="bg1"/>
+                </a:solidFill>
+                <a:latin typeface="TH SarabunPSK" panose="020B0500040200020003" pitchFamily="34" charset="-34"/>
+                <a:cs typeface="TH SarabunPSK" panose="020B0500040200020003" pitchFamily="34" charset="-34"/>
+              </a:rPr>
+              <a:t>. </a:t>
+            </a:r>
+            <a:r>
+              <a:rPr lang="th-TH" sz="2400" dirty="0">
+                <a:solidFill>
+                  <a:schemeClr val="bg1"/>
+                </a:solidFill>
+                <a:latin typeface="TH SarabunPSK" panose="020B0500040200020003" pitchFamily="34" charset="-34"/>
+                <a:cs typeface="TH SarabunPSK" panose="020B0500040200020003" pitchFamily="34" charset="-34"/>
+              </a:rPr>
+              <a:t>ดร</a:t>
+            </a:r>
+            <a:r>
+              <a:rPr lang="en-US" sz="2400" dirty="0">
+                <a:solidFill>
+                  <a:schemeClr val="bg1"/>
+                </a:solidFill>
+                <a:latin typeface="TH SarabunPSK" panose="020B0500040200020003" pitchFamily="34" charset="-34"/>
+                <a:cs typeface="TH SarabunPSK" panose="020B0500040200020003" pitchFamily="34" charset="-34"/>
+              </a:rPr>
+              <a:t>.</a:t>
+            </a:r>
+            <a:r>
+              <a:rPr lang="th-TH" sz="2400" dirty="0">
+                <a:solidFill>
+                  <a:schemeClr val="bg1"/>
+                </a:solidFill>
+                <a:latin typeface="TH SarabunPSK" panose="020B0500040200020003" pitchFamily="34" charset="-34"/>
+                <a:cs typeface="TH SarabunPSK" panose="020B0500040200020003" pitchFamily="34" charset="-34"/>
+              </a:rPr>
+              <a:t>ธนพงศ์ อินทระ สาขาวิชาสถิติ มหาวิทยาลัยขอนแก่น </a:t>
+            </a:r>
+          </a:p>
+        </p:txBody>
+      </p:sp>
     </p:spTree>
     <p:extLst>
       <p:ext uri="{BB962C8B-B14F-4D97-AF65-F5344CB8AC3E}">
@@ -31221,6 +33763,88 @@
           </a:p>
         </p:txBody>
       </p:sp>
+      <p:sp>
+        <p:nvSpPr>
+          <p:cNvPr id="4" name="TextBox 3">
+            <a:extLst>
+              <a:ext uri="{FF2B5EF4-FFF2-40B4-BE49-F238E27FC236}">
+                <a16:creationId xmlns:a16="http://schemas.microsoft.com/office/drawing/2014/main" id="{66B1BC67-856C-C372-BC76-B88674A8D778}"/>
+              </a:ext>
+            </a:extLst>
+          </p:cNvPr>
+          <p:cNvSpPr txBox="1"/>
+          <p:nvPr/>
+        </p:nvSpPr>
+        <p:spPr>
+          <a:xfrm>
+            <a:off x="124837" y="6451715"/>
+            <a:ext cx="5532120" cy="461665"/>
+          </a:xfrm>
+          <a:prstGeom prst="rect">
+            <a:avLst/>
+          </a:prstGeom>
+          <a:noFill/>
+        </p:spPr>
+        <p:txBody>
+          <a:bodyPr wrap="square">
+            <a:spAutoFit/>
+          </a:bodyPr>
+          <a:lstStyle/>
+          <a:p>
+            <a:pPr algn="l"/>
+            <a:r>
+              <a:rPr lang="th-TH" sz="2400" dirty="0">
+                <a:solidFill>
+                  <a:schemeClr val="bg1"/>
+                </a:solidFill>
+                <a:latin typeface="TH SarabunPSK" panose="020B0500040200020003" pitchFamily="34" charset="-34"/>
+                <a:cs typeface="TH SarabunPSK" panose="020B0500040200020003" pitchFamily="34" charset="-34"/>
+              </a:rPr>
+              <a:t>โดย ผศ</a:t>
+            </a:r>
+            <a:r>
+              <a:rPr lang="en-US" sz="2400" dirty="0">
+                <a:solidFill>
+                  <a:schemeClr val="bg1"/>
+                </a:solidFill>
+                <a:latin typeface="TH SarabunPSK" panose="020B0500040200020003" pitchFamily="34" charset="-34"/>
+                <a:cs typeface="TH SarabunPSK" panose="020B0500040200020003" pitchFamily="34" charset="-34"/>
+              </a:rPr>
+              <a:t>. </a:t>
+            </a:r>
+            <a:r>
+              <a:rPr lang="th-TH" sz="2400" dirty="0">
+                <a:solidFill>
+                  <a:schemeClr val="bg1"/>
+                </a:solidFill>
+                <a:latin typeface="TH SarabunPSK" panose="020B0500040200020003" pitchFamily="34" charset="-34"/>
+                <a:cs typeface="TH SarabunPSK" panose="020B0500040200020003" pitchFamily="34" charset="-34"/>
+              </a:rPr>
+              <a:t>ดร</a:t>
+            </a:r>
+            <a:r>
+              <a:rPr lang="en-US" sz="2400" dirty="0">
+                <a:solidFill>
+                  <a:schemeClr val="bg1"/>
+                </a:solidFill>
+                <a:latin typeface="TH SarabunPSK" panose="020B0500040200020003" pitchFamily="34" charset="-34"/>
+                <a:cs typeface="TH SarabunPSK" panose="020B0500040200020003" pitchFamily="34" charset="-34"/>
+              </a:rPr>
+              <a:t>.</a:t>
+            </a:r>
+            <a:r>
+              <a:rPr lang="th-TH" sz="2400" dirty="0">
+                <a:solidFill>
+                  <a:schemeClr val="bg1"/>
+                </a:solidFill>
+                <a:latin typeface="TH SarabunPSK" panose="020B0500040200020003" pitchFamily="34" charset="-34"/>
+                <a:cs typeface="TH SarabunPSK" panose="020B0500040200020003" pitchFamily="34" charset="-34"/>
+              </a:rPr>
+              <a:t>ธนพงศ์ อินทระ สาขาวิชาสถิติ มหาวิทยาลัยขอนแก่น </a:t>
+            </a:r>
+          </a:p>
+        </p:txBody>
+      </p:sp>
     </p:spTree>
     <p:extLst>
       <p:ext uri="{BB962C8B-B14F-4D97-AF65-F5344CB8AC3E}">
@@ -32119,6 +34743,88 @@
           </a:p>
         </p:txBody>
       </p:sp>
+      <p:sp>
+        <p:nvSpPr>
+          <p:cNvPr id="4" name="TextBox 3">
+            <a:extLst>
+              <a:ext uri="{FF2B5EF4-FFF2-40B4-BE49-F238E27FC236}">
+                <a16:creationId xmlns:a16="http://schemas.microsoft.com/office/drawing/2014/main" id="{C8B48098-9189-EA78-A9E8-0B6B4B5AC41C}"/>
+              </a:ext>
+            </a:extLst>
+          </p:cNvPr>
+          <p:cNvSpPr txBox="1"/>
+          <p:nvPr/>
+        </p:nvSpPr>
+        <p:spPr>
+          <a:xfrm>
+            <a:off x="124837" y="6451715"/>
+            <a:ext cx="5532120" cy="461665"/>
+          </a:xfrm>
+          <a:prstGeom prst="rect">
+            <a:avLst/>
+          </a:prstGeom>
+          <a:noFill/>
+        </p:spPr>
+        <p:txBody>
+          <a:bodyPr wrap="square">
+            <a:spAutoFit/>
+          </a:bodyPr>
+          <a:lstStyle/>
+          <a:p>
+            <a:pPr algn="l"/>
+            <a:r>
+              <a:rPr lang="th-TH" sz="2400" dirty="0">
+                <a:solidFill>
+                  <a:schemeClr val="bg1"/>
+                </a:solidFill>
+                <a:latin typeface="TH SarabunPSK" panose="020B0500040200020003" pitchFamily="34" charset="-34"/>
+                <a:cs typeface="TH SarabunPSK" panose="020B0500040200020003" pitchFamily="34" charset="-34"/>
+              </a:rPr>
+              <a:t>โดย ผศ</a:t>
+            </a:r>
+            <a:r>
+              <a:rPr lang="en-US" sz="2400" dirty="0">
+                <a:solidFill>
+                  <a:schemeClr val="bg1"/>
+                </a:solidFill>
+                <a:latin typeface="TH SarabunPSK" panose="020B0500040200020003" pitchFamily="34" charset="-34"/>
+                <a:cs typeface="TH SarabunPSK" panose="020B0500040200020003" pitchFamily="34" charset="-34"/>
+              </a:rPr>
+              <a:t>. </a:t>
+            </a:r>
+            <a:r>
+              <a:rPr lang="th-TH" sz="2400" dirty="0">
+                <a:solidFill>
+                  <a:schemeClr val="bg1"/>
+                </a:solidFill>
+                <a:latin typeface="TH SarabunPSK" panose="020B0500040200020003" pitchFamily="34" charset="-34"/>
+                <a:cs typeface="TH SarabunPSK" panose="020B0500040200020003" pitchFamily="34" charset="-34"/>
+              </a:rPr>
+              <a:t>ดร</a:t>
+            </a:r>
+            <a:r>
+              <a:rPr lang="en-US" sz="2400" dirty="0">
+                <a:solidFill>
+                  <a:schemeClr val="bg1"/>
+                </a:solidFill>
+                <a:latin typeface="TH SarabunPSK" panose="020B0500040200020003" pitchFamily="34" charset="-34"/>
+                <a:cs typeface="TH SarabunPSK" panose="020B0500040200020003" pitchFamily="34" charset="-34"/>
+              </a:rPr>
+              <a:t>.</a:t>
+            </a:r>
+            <a:r>
+              <a:rPr lang="th-TH" sz="2400" dirty="0">
+                <a:solidFill>
+                  <a:schemeClr val="bg1"/>
+                </a:solidFill>
+                <a:latin typeface="TH SarabunPSK" panose="020B0500040200020003" pitchFamily="34" charset="-34"/>
+                <a:cs typeface="TH SarabunPSK" panose="020B0500040200020003" pitchFamily="34" charset="-34"/>
+              </a:rPr>
+              <a:t>ธนพงศ์ อินทระ สาขาวิชาสถิติ มหาวิทยาลัยขอนแก่น </a:t>
+            </a:r>
+          </a:p>
+        </p:txBody>
+      </p:sp>
     </p:spTree>
     <p:extLst>
       <p:ext uri="{BB962C8B-B14F-4D97-AF65-F5344CB8AC3E}">
@@ -33212,6 +35918,88 @@
           </a:p>
         </p:txBody>
       </p:sp>
+      <p:sp>
+        <p:nvSpPr>
+          <p:cNvPr id="4" name="TextBox 3">
+            <a:extLst>
+              <a:ext uri="{FF2B5EF4-FFF2-40B4-BE49-F238E27FC236}">
+                <a16:creationId xmlns:a16="http://schemas.microsoft.com/office/drawing/2014/main" id="{ADE3F245-18EA-7E7E-0FAD-FD75253B4EE5}"/>
+              </a:ext>
+            </a:extLst>
+          </p:cNvPr>
+          <p:cNvSpPr txBox="1"/>
+          <p:nvPr/>
+        </p:nvSpPr>
+        <p:spPr>
+          <a:xfrm>
+            <a:off x="124837" y="6451715"/>
+            <a:ext cx="5532120" cy="461665"/>
+          </a:xfrm>
+          <a:prstGeom prst="rect">
+            <a:avLst/>
+          </a:prstGeom>
+          <a:noFill/>
+        </p:spPr>
+        <p:txBody>
+          <a:bodyPr wrap="square">
+            <a:spAutoFit/>
+          </a:bodyPr>
+          <a:lstStyle/>
+          <a:p>
+            <a:pPr algn="l"/>
+            <a:r>
+              <a:rPr lang="th-TH" sz="2400" dirty="0">
+                <a:solidFill>
+                  <a:schemeClr val="bg1"/>
+                </a:solidFill>
+                <a:latin typeface="TH SarabunPSK" panose="020B0500040200020003" pitchFamily="34" charset="-34"/>
+                <a:cs typeface="TH SarabunPSK" panose="020B0500040200020003" pitchFamily="34" charset="-34"/>
+              </a:rPr>
+              <a:t>โดย ผศ</a:t>
+            </a:r>
+            <a:r>
+              <a:rPr lang="en-US" sz="2400" dirty="0">
+                <a:solidFill>
+                  <a:schemeClr val="bg1"/>
+                </a:solidFill>
+                <a:latin typeface="TH SarabunPSK" panose="020B0500040200020003" pitchFamily="34" charset="-34"/>
+                <a:cs typeface="TH SarabunPSK" panose="020B0500040200020003" pitchFamily="34" charset="-34"/>
+              </a:rPr>
+              <a:t>. </a:t>
+            </a:r>
+            <a:r>
+              <a:rPr lang="th-TH" sz="2400" dirty="0">
+                <a:solidFill>
+                  <a:schemeClr val="bg1"/>
+                </a:solidFill>
+                <a:latin typeface="TH SarabunPSK" panose="020B0500040200020003" pitchFamily="34" charset="-34"/>
+                <a:cs typeface="TH SarabunPSK" panose="020B0500040200020003" pitchFamily="34" charset="-34"/>
+              </a:rPr>
+              <a:t>ดร</a:t>
+            </a:r>
+            <a:r>
+              <a:rPr lang="en-US" sz="2400" dirty="0">
+                <a:solidFill>
+                  <a:schemeClr val="bg1"/>
+                </a:solidFill>
+                <a:latin typeface="TH SarabunPSK" panose="020B0500040200020003" pitchFamily="34" charset="-34"/>
+                <a:cs typeface="TH SarabunPSK" panose="020B0500040200020003" pitchFamily="34" charset="-34"/>
+              </a:rPr>
+              <a:t>.</a:t>
+            </a:r>
+            <a:r>
+              <a:rPr lang="th-TH" sz="2400" dirty="0">
+                <a:solidFill>
+                  <a:schemeClr val="bg1"/>
+                </a:solidFill>
+                <a:latin typeface="TH SarabunPSK" panose="020B0500040200020003" pitchFamily="34" charset="-34"/>
+                <a:cs typeface="TH SarabunPSK" panose="020B0500040200020003" pitchFamily="34" charset="-34"/>
+              </a:rPr>
+              <a:t>ธนพงศ์ อินทระ สาขาวิชาสถิติ มหาวิทยาลัยขอนแก่น </a:t>
+            </a:r>
+          </a:p>
+        </p:txBody>
+      </p:sp>
     </p:spTree>
     <p:extLst>
       <p:ext uri="{BB962C8B-B14F-4D97-AF65-F5344CB8AC3E}">
@@ -34356,6 +37144,88 @@
           </a:p>
         </p:txBody>
       </p:sp>
+      <p:sp>
+        <p:nvSpPr>
+          <p:cNvPr id="4" name="TextBox 3">
+            <a:extLst>
+              <a:ext uri="{FF2B5EF4-FFF2-40B4-BE49-F238E27FC236}">
+                <a16:creationId xmlns:a16="http://schemas.microsoft.com/office/drawing/2014/main" id="{B9ECB5B9-A91D-9F9D-7F67-92EA5A4CFCFA}"/>
+              </a:ext>
+            </a:extLst>
+          </p:cNvPr>
+          <p:cNvSpPr txBox="1"/>
+          <p:nvPr/>
+        </p:nvSpPr>
+        <p:spPr>
+          <a:xfrm>
+            <a:off x="124837" y="6451715"/>
+            <a:ext cx="5532120" cy="461665"/>
+          </a:xfrm>
+          <a:prstGeom prst="rect">
+            <a:avLst/>
+          </a:prstGeom>
+          <a:noFill/>
+        </p:spPr>
+        <p:txBody>
+          <a:bodyPr wrap="square">
+            <a:spAutoFit/>
+          </a:bodyPr>
+          <a:lstStyle/>
+          <a:p>
+            <a:pPr algn="l"/>
+            <a:r>
+              <a:rPr lang="th-TH" sz="2400" dirty="0">
+                <a:solidFill>
+                  <a:schemeClr val="bg1"/>
+                </a:solidFill>
+                <a:latin typeface="TH SarabunPSK" panose="020B0500040200020003" pitchFamily="34" charset="-34"/>
+                <a:cs typeface="TH SarabunPSK" panose="020B0500040200020003" pitchFamily="34" charset="-34"/>
+              </a:rPr>
+              <a:t>โดย ผศ</a:t>
+            </a:r>
+            <a:r>
+              <a:rPr lang="en-US" sz="2400" dirty="0">
+                <a:solidFill>
+                  <a:schemeClr val="bg1"/>
+                </a:solidFill>
+                <a:latin typeface="TH SarabunPSK" panose="020B0500040200020003" pitchFamily="34" charset="-34"/>
+                <a:cs typeface="TH SarabunPSK" panose="020B0500040200020003" pitchFamily="34" charset="-34"/>
+              </a:rPr>
+              <a:t>. </a:t>
+            </a:r>
+            <a:r>
+              <a:rPr lang="th-TH" sz="2400" dirty="0">
+                <a:solidFill>
+                  <a:schemeClr val="bg1"/>
+                </a:solidFill>
+                <a:latin typeface="TH SarabunPSK" panose="020B0500040200020003" pitchFamily="34" charset="-34"/>
+                <a:cs typeface="TH SarabunPSK" panose="020B0500040200020003" pitchFamily="34" charset="-34"/>
+              </a:rPr>
+              <a:t>ดร</a:t>
+            </a:r>
+            <a:r>
+              <a:rPr lang="en-US" sz="2400" dirty="0">
+                <a:solidFill>
+                  <a:schemeClr val="bg1"/>
+                </a:solidFill>
+                <a:latin typeface="TH SarabunPSK" panose="020B0500040200020003" pitchFamily="34" charset="-34"/>
+                <a:cs typeface="TH SarabunPSK" panose="020B0500040200020003" pitchFamily="34" charset="-34"/>
+              </a:rPr>
+              <a:t>.</a:t>
+            </a:r>
+            <a:r>
+              <a:rPr lang="th-TH" sz="2400" dirty="0">
+                <a:solidFill>
+                  <a:schemeClr val="bg1"/>
+                </a:solidFill>
+                <a:latin typeface="TH SarabunPSK" panose="020B0500040200020003" pitchFamily="34" charset="-34"/>
+                <a:cs typeface="TH SarabunPSK" panose="020B0500040200020003" pitchFamily="34" charset="-34"/>
+              </a:rPr>
+              <a:t>ธนพงศ์ อินทระ สาขาวิชาสถิติ มหาวิทยาลัยขอนแก่น </a:t>
+            </a:r>
+          </a:p>
+        </p:txBody>
+      </p:sp>
     </p:spTree>
     <p:extLst>
       <p:ext uri="{BB962C8B-B14F-4D97-AF65-F5344CB8AC3E}">
@@ -35445,6 +38315,88 @@
               </a:highlight>
               <a:latin typeface="Courier New" panose="02070309020205020404" pitchFamily="49" charset="0"/>
             </a:endParaRPr>
+          </a:p>
+        </p:txBody>
+      </p:sp>
+      <p:sp>
+        <p:nvSpPr>
+          <p:cNvPr id="4" name="TextBox 3">
+            <a:extLst>
+              <a:ext uri="{FF2B5EF4-FFF2-40B4-BE49-F238E27FC236}">
+                <a16:creationId xmlns:a16="http://schemas.microsoft.com/office/drawing/2014/main" id="{C68FF311-286E-41B4-5EDD-16801D1B73B9}"/>
+              </a:ext>
+            </a:extLst>
+          </p:cNvPr>
+          <p:cNvSpPr txBox="1"/>
+          <p:nvPr/>
+        </p:nvSpPr>
+        <p:spPr>
+          <a:xfrm>
+            <a:off x="124837" y="6451715"/>
+            <a:ext cx="5532120" cy="461665"/>
+          </a:xfrm>
+          <a:prstGeom prst="rect">
+            <a:avLst/>
+          </a:prstGeom>
+          <a:noFill/>
+        </p:spPr>
+        <p:txBody>
+          <a:bodyPr wrap="square">
+            <a:spAutoFit/>
+          </a:bodyPr>
+          <a:lstStyle/>
+          <a:p>
+            <a:pPr algn="l"/>
+            <a:r>
+              <a:rPr lang="th-TH" sz="2400" dirty="0">
+                <a:solidFill>
+                  <a:schemeClr val="bg1"/>
+                </a:solidFill>
+                <a:latin typeface="TH SarabunPSK" panose="020B0500040200020003" pitchFamily="34" charset="-34"/>
+                <a:cs typeface="TH SarabunPSK" panose="020B0500040200020003" pitchFamily="34" charset="-34"/>
+              </a:rPr>
+              <a:t>โดย ผศ</a:t>
+            </a:r>
+            <a:r>
+              <a:rPr lang="en-US" sz="2400" dirty="0">
+                <a:solidFill>
+                  <a:schemeClr val="bg1"/>
+                </a:solidFill>
+                <a:latin typeface="TH SarabunPSK" panose="020B0500040200020003" pitchFamily="34" charset="-34"/>
+                <a:cs typeface="TH SarabunPSK" panose="020B0500040200020003" pitchFamily="34" charset="-34"/>
+              </a:rPr>
+              <a:t>. </a:t>
+            </a:r>
+            <a:r>
+              <a:rPr lang="th-TH" sz="2400" dirty="0">
+                <a:solidFill>
+                  <a:schemeClr val="bg1"/>
+                </a:solidFill>
+                <a:latin typeface="TH SarabunPSK" panose="020B0500040200020003" pitchFamily="34" charset="-34"/>
+                <a:cs typeface="TH SarabunPSK" panose="020B0500040200020003" pitchFamily="34" charset="-34"/>
+              </a:rPr>
+              <a:t>ดร</a:t>
+            </a:r>
+            <a:r>
+              <a:rPr lang="en-US" sz="2400" dirty="0">
+                <a:solidFill>
+                  <a:schemeClr val="bg1"/>
+                </a:solidFill>
+                <a:latin typeface="TH SarabunPSK" panose="020B0500040200020003" pitchFamily="34" charset="-34"/>
+                <a:cs typeface="TH SarabunPSK" panose="020B0500040200020003" pitchFamily="34" charset="-34"/>
+              </a:rPr>
+              <a:t>.</a:t>
+            </a:r>
+            <a:r>
+              <a:rPr lang="th-TH" sz="2400" dirty="0">
+                <a:solidFill>
+                  <a:schemeClr val="bg1"/>
+                </a:solidFill>
+                <a:latin typeface="TH SarabunPSK" panose="020B0500040200020003" pitchFamily="34" charset="-34"/>
+                <a:cs typeface="TH SarabunPSK" panose="020B0500040200020003" pitchFamily="34" charset="-34"/>
+              </a:rPr>
+              <a:t>ธนพงศ์ อินทระ สาขาวิชาสถิติ มหาวิทยาลัยขอนแก่น </a:t>
+            </a:r>
           </a:p>
         </p:txBody>
       </p:sp>

</xml_diff>